<commit_message>
add ci-sis logo and fix typos
</commit_message>
<xml_diff>
--- a/input/images-source/Schema liens ressources profil.pptx
+++ b/input/images-source/Schema liens ressources profil.pptx
@@ -3260,26 +3260,13 @@
           <a:p>
             <a:pPr algn="ctr"/>
             <a:r>
-              <a:rPr lang="fr-FR" sz="1200">
+              <a:rPr lang="fr-FR" sz="1200" dirty="0">
                 <a:solidFill>
                   <a:schemeClr val="tx1"/>
                 </a:solidFill>
               </a:rPr>
-              <a:t>Profils </a:t>
-            </a:r>
-            <a:r>
-              <a:rPr lang="fr-FR" sz="1200" err="1">
-                <a:solidFill>
-                  <a:schemeClr val="tx1"/>
-                </a:solidFill>
-              </a:rPr>
-              <a:t>InteropSanté</a:t>
-            </a:r>
-            <a:endParaRPr lang="fr-FR" sz="1200">
-              <a:solidFill>
-                <a:schemeClr val="tx1"/>
-              </a:solidFill>
-            </a:endParaRPr>
+              <a:t>Profils InteropSanté</a:t>
+            </a:r>
           </a:p>
         </p:txBody>
       </p:sp>
@@ -3653,18 +3640,13 @@
           <a:p>
             <a:pPr algn="ctr"/>
             <a:r>
-              <a:rPr lang="fr-FR" sz="1200" err="1">
+              <a:rPr lang="fr-FR" sz="1200" dirty="0">
                 <a:solidFill>
                   <a:schemeClr val="tx1"/>
                 </a:solidFill>
               </a:rPr>
               <a:t>bmi</a:t>
             </a:r>
-            <a:endParaRPr lang="fr-FR" sz="1200">
-              <a:solidFill>
-                <a:schemeClr val="tx1"/>
-              </a:solidFill>
-            </a:endParaRPr>
           </a:p>
         </p:txBody>
       </p:sp>
@@ -3704,18 +3686,13 @@
           <a:p>
             <a:pPr algn="ctr"/>
             <a:r>
-              <a:rPr lang="fr-FR" sz="1200" err="1">
+              <a:rPr lang="fr-FR" sz="1200" dirty="0">
                 <a:solidFill>
                   <a:schemeClr val="tx1"/>
                 </a:solidFill>
               </a:rPr>
               <a:t>heartrate</a:t>
             </a:r>
-            <a:endParaRPr lang="fr-FR" sz="1200">
-              <a:solidFill>
-                <a:schemeClr val="tx1"/>
-              </a:solidFill>
-            </a:endParaRPr>
           </a:p>
         </p:txBody>
       </p:sp>
@@ -3755,18 +3732,13 @@
           <a:p>
             <a:pPr algn="ctr"/>
             <a:r>
-              <a:rPr lang="fr-FR" sz="1200" err="1">
+              <a:rPr lang="fr-FR" sz="1200" dirty="0">
                 <a:solidFill>
                   <a:schemeClr val="tx1"/>
                 </a:solidFill>
               </a:rPr>
               <a:t>bodyweight</a:t>
             </a:r>
-            <a:endParaRPr lang="fr-FR" sz="1200">
-              <a:solidFill>
-                <a:schemeClr val="tx1"/>
-              </a:solidFill>
-            </a:endParaRPr>
           </a:p>
         </p:txBody>
       </p:sp>
@@ -3806,18 +3778,13 @@
           <a:p>
             <a:pPr algn="ctr"/>
             <a:r>
-              <a:rPr lang="fr-FR" sz="1200" err="1">
+              <a:rPr lang="fr-FR" sz="1200" dirty="0">
                 <a:solidFill>
                   <a:schemeClr val="tx1"/>
                 </a:solidFill>
               </a:rPr>
               <a:t>bodyheight</a:t>
             </a:r>
-            <a:endParaRPr lang="fr-FR" sz="1200">
-              <a:solidFill>
-                <a:schemeClr val="tx1"/>
-              </a:solidFill>
-            </a:endParaRPr>
           </a:p>
         </p:txBody>
       </p:sp>
@@ -3857,18 +3824,13 @@
           <a:p>
             <a:pPr algn="ctr"/>
             <a:r>
-              <a:rPr lang="fr-FR" sz="1200" err="1">
+              <a:rPr lang="fr-FR" sz="1200" dirty="0">
                 <a:solidFill>
                   <a:schemeClr val="tx1"/>
                 </a:solidFill>
               </a:rPr>
               <a:t>bodytemperature</a:t>
             </a:r>
-            <a:endParaRPr lang="fr-FR" sz="1200">
-              <a:solidFill>
-                <a:schemeClr val="tx1"/>
-              </a:solidFill>
-            </a:endParaRPr>
           </a:p>
         </p:txBody>
       </p:sp>
@@ -4088,18 +4050,13 @@
           <a:p>
             <a:pPr algn="ctr"/>
             <a:r>
-              <a:rPr lang="fr-FR" sz="1200" dirty="0" err="1">
+              <a:rPr lang="fr-FR" sz="1200" dirty="0">
                 <a:solidFill>
                   <a:schemeClr val="tx1"/>
                 </a:solidFill>
               </a:rPr>
               <a:t>FrObservationBmi</a:t>
             </a:r>
-            <a:endParaRPr lang="fr-FR" sz="1200" dirty="0">
-              <a:solidFill>
-                <a:schemeClr val="tx1"/>
-              </a:solidFill>
-            </a:endParaRPr>
           </a:p>
         </p:txBody>
       </p:sp>
@@ -4139,18 +4096,13 @@
           <a:p>
             <a:pPr algn="ctr"/>
             <a:r>
-              <a:rPr lang="fr-FR" sz="1200" err="1">
+              <a:rPr lang="fr-FR" sz="1200" dirty="0">
                 <a:solidFill>
                   <a:schemeClr val="tx1"/>
                 </a:solidFill>
               </a:rPr>
               <a:t>FrObservationHeartrate</a:t>
             </a:r>
-            <a:endParaRPr lang="fr-FR" sz="1200">
-              <a:solidFill>
-                <a:schemeClr val="tx1"/>
-              </a:solidFill>
-            </a:endParaRPr>
           </a:p>
         </p:txBody>
       </p:sp>
@@ -4190,18 +4142,13 @@
           <a:p>
             <a:pPr algn="ctr"/>
             <a:r>
-              <a:rPr lang="fr-FR" sz="1200" err="1">
+              <a:rPr lang="fr-FR" sz="1200" dirty="0">
                 <a:solidFill>
                   <a:schemeClr val="tx1"/>
                 </a:solidFill>
               </a:rPr>
               <a:t>FrObservationBodyWeight</a:t>
             </a:r>
-            <a:endParaRPr lang="fr-FR" sz="1200">
-              <a:solidFill>
-                <a:schemeClr val="tx1"/>
-              </a:solidFill>
-            </a:endParaRPr>
           </a:p>
         </p:txBody>
       </p:sp>
@@ -4241,18 +4188,13 @@
           <a:p>
             <a:pPr algn="ctr"/>
             <a:r>
-              <a:rPr lang="fr-FR" sz="1200" err="1">
+              <a:rPr lang="fr-FR" sz="1200" dirty="0">
                 <a:solidFill>
                   <a:schemeClr val="tx1"/>
                 </a:solidFill>
               </a:rPr>
               <a:t>FrObservationBodyHeight</a:t>
             </a:r>
-            <a:endParaRPr lang="fr-FR" sz="1200">
-              <a:solidFill>
-                <a:schemeClr val="tx1"/>
-              </a:solidFill>
-            </a:endParaRPr>
           </a:p>
         </p:txBody>
       </p:sp>
@@ -4292,18 +4234,13 @@
           <a:p>
             <a:pPr algn="ctr"/>
             <a:r>
-              <a:rPr lang="fr-FR" sz="1200" err="1">
+              <a:rPr lang="fr-FR" sz="1200" dirty="0">
                 <a:solidFill>
                   <a:schemeClr val="tx1"/>
                 </a:solidFill>
               </a:rPr>
               <a:t>FrObservationBodyTemperature</a:t>
             </a:r>
-            <a:endParaRPr lang="fr-FR" sz="1200">
-              <a:solidFill>
-                <a:schemeClr val="tx1"/>
-              </a:solidFill>
-            </a:endParaRPr>
           </a:p>
         </p:txBody>
       </p:sp>
@@ -4523,18 +4460,13 @@
           <a:p>
             <a:pPr algn="ctr"/>
             <a:r>
-              <a:rPr lang="fr-FR" sz="1000" dirty="0" err="1">
+              <a:rPr lang="fr-FR" sz="1000" dirty="0">
                 <a:solidFill>
                   <a:schemeClr val="tx1"/>
                 </a:solidFill>
               </a:rPr>
               <a:t>MesFrObservationBmi</a:t>
             </a:r>
-            <a:endParaRPr lang="fr-FR" sz="1000" dirty="0">
-              <a:solidFill>
-                <a:schemeClr val="tx1"/>
-              </a:solidFill>
-            </a:endParaRPr>
           </a:p>
         </p:txBody>
       </p:sp>
@@ -4574,18 +4506,13 @@
           <a:p>
             <a:pPr algn="ctr"/>
             <a:r>
-              <a:rPr lang="fr-FR" sz="1000" dirty="0" err="1">
+              <a:rPr lang="fr-FR" sz="1000" dirty="0">
                 <a:solidFill>
                   <a:schemeClr val="tx1"/>
                 </a:solidFill>
               </a:rPr>
               <a:t>MesFrObservationHeartrate</a:t>
             </a:r>
-            <a:endParaRPr lang="fr-FR" sz="1000" dirty="0">
-              <a:solidFill>
-                <a:schemeClr val="tx1"/>
-              </a:solidFill>
-            </a:endParaRPr>
           </a:p>
         </p:txBody>
       </p:sp>
@@ -4625,18 +4552,13 @@
           <a:p>
             <a:pPr algn="ctr"/>
             <a:r>
-              <a:rPr lang="fr-FR" sz="1000" dirty="0" err="1">
+              <a:rPr lang="fr-FR" sz="1000" dirty="0">
                 <a:solidFill>
                   <a:schemeClr val="tx1"/>
                 </a:solidFill>
               </a:rPr>
               <a:t>MesFrObservationBodyWeight</a:t>
             </a:r>
-            <a:endParaRPr lang="fr-FR" sz="1000" dirty="0">
-              <a:solidFill>
-                <a:schemeClr val="tx1"/>
-              </a:solidFill>
-            </a:endParaRPr>
           </a:p>
         </p:txBody>
       </p:sp>
@@ -4676,18 +4598,13 @@
           <a:p>
             <a:pPr algn="ctr"/>
             <a:r>
-              <a:rPr lang="fr-FR" sz="1000" dirty="0" err="1">
+              <a:rPr lang="fr-FR" sz="1000" dirty="0">
                 <a:solidFill>
                   <a:schemeClr val="tx1"/>
                 </a:solidFill>
               </a:rPr>
               <a:t>MesFrObservationBodyHeight</a:t>
             </a:r>
-            <a:endParaRPr lang="fr-FR" sz="1000" dirty="0">
-              <a:solidFill>
-                <a:schemeClr val="tx1"/>
-              </a:solidFill>
-            </a:endParaRPr>
           </a:p>
         </p:txBody>
       </p:sp>
@@ -4727,18 +4644,13 @@
           <a:p>
             <a:pPr algn="ctr"/>
             <a:r>
-              <a:rPr lang="fr-FR" sz="1000" dirty="0" err="1">
+              <a:rPr lang="fr-FR" sz="1000" dirty="0">
                 <a:solidFill>
                   <a:schemeClr val="tx1"/>
                 </a:solidFill>
               </a:rPr>
               <a:t>MesFrObservationBodyTemperature</a:t>
             </a:r>
-            <a:endParaRPr lang="fr-FR" sz="1000" dirty="0">
-              <a:solidFill>
-                <a:schemeClr val="tx1"/>
-              </a:solidFill>
-            </a:endParaRPr>
           </a:p>
         </p:txBody>
       </p:sp>
@@ -4824,18 +4736,13 @@
           <a:p>
             <a:pPr algn="ctr"/>
             <a:r>
-              <a:rPr lang="fr-FR" sz="1000" dirty="0" err="1">
+              <a:rPr lang="fr-FR" sz="1000" dirty="0">
                 <a:solidFill>
                   <a:schemeClr val="tx1"/>
                 </a:solidFill>
               </a:rPr>
               <a:t>MesObservationStepsByDay</a:t>
             </a:r>
-            <a:endParaRPr lang="fr-FR" sz="1000" dirty="0">
-              <a:solidFill>
-                <a:schemeClr val="tx1"/>
-              </a:solidFill>
-            </a:endParaRPr>
           </a:p>
         </p:txBody>
       </p:sp>
@@ -4875,18 +4782,13 @@
           <a:p>
             <a:pPr algn="ctr"/>
             <a:r>
-              <a:rPr lang="fr-FR" sz="1000" dirty="0" err="1">
+              <a:rPr lang="fr-FR" sz="1000" dirty="0">
                 <a:solidFill>
                   <a:schemeClr val="tx1"/>
                 </a:solidFill>
               </a:rPr>
               <a:t>MesObservationPainSeverity</a:t>
             </a:r>
-            <a:endParaRPr lang="fr-FR" sz="1000" dirty="0">
-              <a:solidFill>
-                <a:schemeClr val="tx1"/>
-              </a:solidFill>
-            </a:endParaRPr>
           </a:p>
         </p:txBody>
       </p:sp>
@@ -4926,18 +4828,13 @@
           <a:p>
             <a:pPr algn="ctr"/>
             <a:r>
-              <a:rPr lang="fr-FR" sz="1000" dirty="0" err="1">
+              <a:rPr lang="fr-FR" sz="1000" dirty="0">
                 <a:solidFill>
                   <a:schemeClr val="tx1"/>
                 </a:solidFill>
               </a:rPr>
               <a:t>MesObservationWaistCircumference</a:t>
             </a:r>
-            <a:endParaRPr lang="fr-FR" sz="1000" dirty="0">
-              <a:solidFill>
-                <a:schemeClr val="tx1"/>
-              </a:solidFill>
-            </a:endParaRPr>
           </a:p>
         </p:txBody>
       </p:sp>
@@ -4977,18 +4874,13 @@
           <a:p>
             <a:pPr algn="ctr"/>
             <a:r>
-              <a:rPr lang="fr-FR" sz="1200" err="1">
+              <a:rPr lang="fr-FR" sz="1200" dirty="0">
                 <a:solidFill>
                   <a:schemeClr val="tx1"/>
                 </a:solidFill>
               </a:rPr>
               <a:t>bloodpressure</a:t>
             </a:r>
-            <a:endParaRPr lang="fr-FR" sz="1200">
-              <a:solidFill>
-                <a:schemeClr val="tx1"/>
-              </a:solidFill>
-            </a:endParaRPr>
           </a:p>
         </p:txBody>
       </p:sp>
@@ -5347,18 +5239,13 @@
           <a:p>
             <a:pPr algn="ctr"/>
             <a:r>
-              <a:rPr lang="fr-FR" sz="1000" dirty="0" err="1">
+              <a:rPr lang="fr-FR" sz="1000" dirty="0">
                 <a:solidFill>
                   <a:schemeClr val="tx1"/>
                 </a:solidFill>
               </a:rPr>
               <a:t>MesFrObservationBP</a:t>
             </a:r>
-            <a:endParaRPr lang="fr-FR" sz="1000" dirty="0">
-              <a:solidFill>
-                <a:schemeClr val="tx1"/>
-              </a:solidFill>
-            </a:endParaRPr>
           </a:p>
         </p:txBody>
       </p:sp>
@@ -5404,18 +5291,13 @@
           <a:p>
             <a:pPr algn="ctr"/>
             <a:r>
-              <a:rPr lang="fr-FR" sz="1000" dirty="0" err="1">
+              <a:rPr lang="fr-FR" sz="1000" dirty="0">
                 <a:solidFill>
                   <a:schemeClr val="tx1"/>
                 </a:solidFill>
               </a:rPr>
               <a:t>MesObservationGlucose</a:t>
             </a:r>
-            <a:endParaRPr lang="fr-FR" sz="1000" dirty="0">
-              <a:solidFill>
-                <a:schemeClr val="tx1"/>
-              </a:solidFill>
-            </a:endParaRPr>
           </a:p>
         </p:txBody>
       </p:sp>
@@ -5507,18 +5389,13 @@
           <a:p>
             <a:pPr algn="ctr"/>
             <a:r>
-              <a:rPr lang="fr-FR" sz="1000" dirty="0" err="1">
+              <a:rPr lang="fr-FR" sz="1000" dirty="0">
                 <a:solidFill>
                   <a:schemeClr val="tx1"/>
                 </a:solidFill>
               </a:rPr>
               <a:t>MesObservationHeadCircumference</a:t>
             </a:r>
-            <a:endParaRPr lang="fr-FR" sz="1000" dirty="0">
-              <a:solidFill>
-                <a:schemeClr val="tx1"/>
-              </a:solidFill>
-            </a:endParaRPr>
           </a:p>
         </p:txBody>
       </p:sp>
@@ -5795,26 +5672,13 @@
           <a:p>
             <a:pPr algn="ctr"/>
             <a:r>
-              <a:rPr lang="fr-FR" sz="1200">
+              <a:rPr lang="fr-FR" sz="1200" dirty="0">
                 <a:solidFill>
                   <a:schemeClr val="tx1"/>
                 </a:solidFill>
               </a:rPr>
-              <a:t>Profils </a:t>
-            </a:r>
-            <a:r>
-              <a:rPr lang="fr-FR" sz="1200" err="1">
-                <a:solidFill>
-                  <a:schemeClr val="tx1"/>
-                </a:solidFill>
-              </a:rPr>
-              <a:t>InteropSanté</a:t>
-            </a:r>
-            <a:endParaRPr lang="fr-FR" sz="1200">
-              <a:solidFill>
-                <a:schemeClr val="tx1"/>
-              </a:solidFill>
-            </a:endParaRPr>
+              <a:t>Profils InteropSanté</a:t>
+            </a:r>
           </a:p>
         </p:txBody>
       </p:sp>
@@ -5859,26 +5723,13 @@
           <a:p>
             <a:pPr algn="ctr"/>
             <a:r>
-              <a:rPr lang="fr-FR" sz="1200">
+              <a:rPr lang="fr-FR" sz="1200" dirty="0">
                 <a:solidFill>
                   <a:schemeClr val="tx1"/>
                 </a:solidFill>
               </a:rPr>
-              <a:t>Vital-</a:t>
-            </a:r>
-            <a:r>
-              <a:rPr lang="fr-FR" sz="1200" err="1">
-                <a:solidFill>
-                  <a:schemeClr val="tx1"/>
-                </a:solidFill>
-              </a:rPr>
-              <a:t>signs</a:t>
-            </a:r>
-            <a:endParaRPr lang="fr-FR" sz="1200">
-              <a:solidFill>
-                <a:schemeClr val="tx1"/>
-              </a:solidFill>
-            </a:endParaRPr>
+              <a:t>Vital-signs</a:t>
+            </a:r>
           </a:p>
         </p:txBody>
       </p:sp>
@@ -6243,18 +6094,13 @@
           <a:p>
             <a:pPr algn="ctr"/>
             <a:r>
-              <a:rPr lang="fr-FR" sz="1200" err="1">
+              <a:rPr lang="fr-FR" sz="1200" dirty="0">
                 <a:solidFill>
                   <a:schemeClr val="tx1"/>
                 </a:solidFill>
               </a:rPr>
               <a:t>bmi</a:t>
             </a:r>
-            <a:endParaRPr lang="fr-FR" sz="1200">
-              <a:solidFill>
-                <a:schemeClr val="tx1"/>
-              </a:solidFill>
-            </a:endParaRPr>
           </a:p>
         </p:txBody>
       </p:sp>
@@ -6300,18 +6146,13 @@
           <a:p>
             <a:pPr algn="ctr"/>
             <a:r>
-              <a:rPr lang="fr-FR" sz="1200" err="1">
+              <a:rPr lang="fr-FR" sz="1200" dirty="0">
                 <a:solidFill>
                   <a:schemeClr val="tx1"/>
                 </a:solidFill>
               </a:rPr>
               <a:t>heartrate</a:t>
             </a:r>
-            <a:endParaRPr lang="fr-FR" sz="1200">
-              <a:solidFill>
-                <a:schemeClr val="tx1"/>
-              </a:solidFill>
-            </a:endParaRPr>
           </a:p>
         </p:txBody>
       </p:sp>
@@ -6357,18 +6198,13 @@
           <a:p>
             <a:pPr algn="ctr"/>
             <a:r>
-              <a:rPr lang="fr-FR" sz="1200" err="1">
+              <a:rPr lang="fr-FR" sz="1200" dirty="0">
                 <a:solidFill>
                   <a:schemeClr val="tx1"/>
                 </a:solidFill>
               </a:rPr>
               <a:t>bodyweight</a:t>
             </a:r>
-            <a:endParaRPr lang="fr-FR" sz="1200">
-              <a:solidFill>
-                <a:schemeClr val="tx1"/>
-              </a:solidFill>
-            </a:endParaRPr>
           </a:p>
         </p:txBody>
       </p:sp>
@@ -6414,18 +6250,13 @@
           <a:p>
             <a:pPr algn="ctr"/>
             <a:r>
-              <a:rPr lang="fr-FR" sz="1200" err="1">
+              <a:rPr lang="fr-FR" sz="1200" dirty="0">
                 <a:solidFill>
                   <a:schemeClr val="tx1"/>
                 </a:solidFill>
               </a:rPr>
               <a:t>bodyheight</a:t>
             </a:r>
-            <a:endParaRPr lang="fr-FR" sz="1200">
-              <a:solidFill>
-                <a:schemeClr val="tx1"/>
-              </a:solidFill>
-            </a:endParaRPr>
           </a:p>
         </p:txBody>
       </p:sp>
@@ -6471,18 +6302,13 @@
           <a:p>
             <a:pPr algn="ctr"/>
             <a:r>
-              <a:rPr lang="fr-FR" sz="1200" err="1">
+              <a:rPr lang="fr-FR" sz="1200" dirty="0">
                 <a:solidFill>
                   <a:schemeClr val="tx1"/>
                 </a:solidFill>
               </a:rPr>
               <a:t>bodytemperature</a:t>
             </a:r>
-            <a:endParaRPr lang="fr-FR" sz="1200">
-              <a:solidFill>
-                <a:schemeClr val="tx1"/>
-              </a:solidFill>
-            </a:endParaRPr>
           </a:p>
         </p:txBody>
       </p:sp>
@@ -6738,18 +6564,13 @@
           <a:p>
             <a:pPr algn="ctr"/>
             <a:r>
-              <a:rPr lang="fr-FR" sz="1200" dirty="0" err="1">
+              <a:rPr lang="fr-FR" sz="1200" dirty="0">
                 <a:solidFill>
                   <a:schemeClr val="tx1"/>
                 </a:solidFill>
               </a:rPr>
               <a:t>FrObservationBmi</a:t>
             </a:r>
-            <a:endParaRPr lang="fr-FR" sz="1200" dirty="0">
-              <a:solidFill>
-                <a:schemeClr val="tx1"/>
-              </a:solidFill>
-            </a:endParaRPr>
           </a:p>
         </p:txBody>
       </p:sp>
@@ -6795,18 +6616,13 @@
           <a:p>
             <a:pPr algn="ctr"/>
             <a:r>
-              <a:rPr lang="fr-FR" sz="1200" err="1">
+              <a:rPr lang="fr-FR" sz="1200" dirty="0">
                 <a:solidFill>
                   <a:schemeClr val="tx1"/>
                 </a:solidFill>
               </a:rPr>
               <a:t>FrObservationHeartrate</a:t>
             </a:r>
-            <a:endParaRPr lang="fr-FR" sz="1200">
-              <a:solidFill>
-                <a:schemeClr val="tx1"/>
-              </a:solidFill>
-            </a:endParaRPr>
           </a:p>
         </p:txBody>
       </p:sp>
@@ -6852,18 +6668,13 @@
           <a:p>
             <a:pPr algn="ctr"/>
             <a:r>
-              <a:rPr lang="fr-FR" sz="1200" err="1">
+              <a:rPr lang="fr-FR" sz="1200" dirty="0">
                 <a:solidFill>
                   <a:schemeClr val="tx1"/>
                 </a:solidFill>
               </a:rPr>
               <a:t>FrObservationBodyWeight</a:t>
             </a:r>
-            <a:endParaRPr lang="fr-FR" sz="1200">
-              <a:solidFill>
-                <a:schemeClr val="tx1"/>
-              </a:solidFill>
-            </a:endParaRPr>
           </a:p>
         </p:txBody>
       </p:sp>
@@ -6909,18 +6720,13 @@
           <a:p>
             <a:pPr algn="ctr"/>
             <a:r>
-              <a:rPr lang="fr-FR" sz="1200" err="1">
+              <a:rPr lang="fr-FR" sz="1200" dirty="0">
                 <a:solidFill>
                   <a:schemeClr val="tx1"/>
                 </a:solidFill>
               </a:rPr>
               <a:t>FrObservationBodyHeight</a:t>
             </a:r>
-            <a:endParaRPr lang="fr-FR" sz="1200">
-              <a:solidFill>
-                <a:schemeClr val="tx1"/>
-              </a:solidFill>
-            </a:endParaRPr>
           </a:p>
         </p:txBody>
       </p:sp>
@@ -6966,18 +6772,13 @@
           <a:p>
             <a:pPr algn="ctr"/>
             <a:r>
-              <a:rPr lang="fr-FR" sz="1200" err="1">
+              <a:rPr lang="fr-FR" sz="1200" dirty="0">
                 <a:solidFill>
                   <a:schemeClr val="tx1"/>
                 </a:solidFill>
               </a:rPr>
               <a:t>FrObservationBodyTemperature</a:t>
             </a:r>
-            <a:endParaRPr lang="fr-FR" sz="1200">
-              <a:solidFill>
-                <a:schemeClr val="tx1"/>
-              </a:solidFill>
-            </a:endParaRPr>
           </a:p>
         </p:txBody>
       </p:sp>
@@ -7233,18 +7034,13 @@
           <a:p>
             <a:pPr algn="ctr"/>
             <a:r>
-              <a:rPr lang="fr-FR" sz="1000" dirty="0" err="1">
+              <a:rPr lang="fr-FR" sz="1000" dirty="0">
                 <a:solidFill>
                   <a:schemeClr val="tx1"/>
                 </a:solidFill>
               </a:rPr>
               <a:t>MesFrObservationBmi</a:t>
             </a:r>
-            <a:endParaRPr lang="fr-FR" sz="1000" dirty="0">
-              <a:solidFill>
-                <a:schemeClr val="tx1"/>
-              </a:solidFill>
-            </a:endParaRPr>
           </a:p>
         </p:txBody>
       </p:sp>
@@ -7290,18 +7086,13 @@
           <a:p>
             <a:pPr algn="ctr"/>
             <a:r>
-              <a:rPr lang="fr-FR" sz="1000" dirty="0" err="1">
+              <a:rPr lang="fr-FR" sz="1000" dirty="0">
                 <a:solidFill>
                   <a:schemeClr val="tx1"/>
                 </a:solidFill>
               </a:rPr>
               <a:t>MesFrObservationHeartrate</a:t>
             </a:r>
-            <a:endParaRPr lang="fr-FR" sz="1000" dirty="0">
-              <a:solidFill>
-                <a:schemeClr val="tx1"/>
-              </a:solidFill>
-            </a:endParaRPr>
           </a:p>
         </p:txBody>
       </p:sp>
@@ -7347,18 +7138,13 @@
           <a:p>
             <a:pPr algn="ctr"/>
             <a:r>
-              <a:rPr lang="fr-FR" sz="1000" dirty="0" err="1">
+              <a:rPr lang="fr-FR" sz="1000" dirty="0">
                 <a:solidFill>
                   <a:schemeClr val="tx1"/>
                 </a:solidFill>
               </a:rPr>
               <a:t>MesFrObservationBodyWeight</a:t>
             </a:r>
-            <a:endParaRPr lang="fr-FR" sz="1000" dirty="0">
-              <a:solidFill>
-                <a:schemeClr val="tx1"/>
-              </a:solidFill>
-            </a:endParaRPr>
           </a:p>
         </p:txBody>
       </p:sp>
@@ -7404,18 +7190,13 @@
           <a:p>
             <a:pPr algn="ctr"/>
             <a:r>
-              <a:rPr lang="fr-FR" sz="1000" dirty="0" err="1">
+              <a:rPr lang="fr-FR" sz="1000" dirty="0">
                 <a:solidFill>
                   <a:schemeClr val="tx1"/>
                 </a:solidFill>
               </a:rPr>
               <a:t>MesFrObservationBodyHeight</a:t>
             </a:r>
-            <a:endParaRPr lang="fr-FR" sz="1000" dirty="0">
-              <a:solidFill>
-                <a:schemeClr val="tx1"/>
-              </a:solidFill>
-            </a:endParaRPr>
           </a:p>
         </p:txBody>
       </p:sp>
@@ -7461,18 +7242,13 @@
           <a:p>
             <a:pPr algn="ctr"/>
             <a:r>
-              <a:rPr lang="fr-FR" sz="1000" dirty="0" err="1">
+              <a:rPr lang="fr-FR" sz="1000" dirty="0">
                 <a:solidFill>
                   <a:schemeClr val="tx1"/>
                 </a:solidFill>
               </a:rPr>
               <a:t>MesFrObservationBodyTemperature</a:t>
             </a:r>
-            <a:endParaRPr lang="fr-FR" sz="1000" dirty="0">
-              <a:solidFill>
-                <a:schemeClr val="tx1"/>
-              </a:solidFill>
-            </a:endParaRPr>
           </a:p>
         </p:txBody>
       </p:sp>
@@ -7523,7 +7299,7 @@
                   <a:schemeClr val="tx1"/>
                 </a:solidFill>
               </a:rPr>
-              <a:t>Profils MES</a:t>
+              <a:t>Profils mesures</a:t>
             </a:r>
           </a:p>
         </p:txBody>
@@ -7570,18 +7346,13 @@
           <a:p>
             <a:pPr algn="ctr"/>
             <a:r>
-              <a:rPr lang="fr-FR" sz="1000" dirty="0" err="1">
+              <a:rPr lang="fr-FR" sz="1000" dirty="0">
                 <a:solidFill>
                   <a:schemeClr val="tx1"/>
                 </a:solidFill>
               </a:rPr>
               <a:t>MesObservationStepsByDay</a:t>
             </a:r>
-            <a:endParaRPr lang="fr-FR" sz="1000" dirty="0">
-              <a:solidFill>
-                <a:schemeClr val="tx1"/>
-              </a:solidFill>
-            </a:endParaRPr>
           </a:p>
         </p:txBody>
       </p:sp>
@@ -7627,18 +7398,13 @@
           <a:p>
             <a:pPr algn="ctr"/>
             <a:r>
-              <a:rPr lang="fr-FR" sz="1000" dirty="0" err="1">
+              <a:rPr lang="fr-FR" sz="1000" dirty="0">
                 <a:solidFill>
                   <a:schemeClr val="tx1"/>
                 </a:solidFill>
               </a:rPr>
               <a:t>MesObservationPainSeverity</a:t>
             </a:r>
-            <a:endParaRPr lang="fr-FR" sz="1000" dirty="0">
-              <a:solidFill>
-                <a:schemeClr val="tx1"/>
-              </a:solidFill>
-            </a:endParaRPr>
           </a:p>
         </p:txBody>
       </p:sp>
@@ -7684,18 +7450,13 @@
           <a:p>
             <a:pPr algn="ctr"/>
             <a:r>
-              <a:rPr lang="fr-FR" sz="1000" dirty="0" err="1">
+              <a:rPr lang="fr-FR" sz="1000" dirty="0">
                 <a:solidFill>
                   <a:schemeClr val="tx1"/>
                 </a:solidFill>
               </a:rPr>
               <a:t>MesObservationWaistCircumference</a:t>
             </a:r>
-            <a:endParaRPr lang="fr-FR" sz="1000" dirty="0">
-              <a:solidFill>
-                <a:schemeClr val="tx1"/>
-              </a:solidFill>
-            </a:endParaRPr>
           </a:p>
         </p:txBody>
       </p:sp>
@@ -7741,18 +7502,13 @@
           <a:p>
             <a:pPr algn="ctr"/>
             <a:r>
-              <a:rPr lang="fr-FR" sz="1200" err="1">
+              <a:rPr lang="fr-FR" sz="1200" dirty="0">
                 <a:solidFill>
                   <a:schemeClr val="tx1"/>
                 </a:solidFill>
               </a:rPr>
               <a:t>bloodpressure</a:t>
             </a:r>
-            <a:endParaRPr lang="fr-FR" sz="1200">
-              <a:solidFill>
-                <a:schemeClr val="tx1"/>
-              </a:solidFill>
-            </a:endParaRPr>
           </a:p>
         </p:txBody>
       </p:sp>
@@ -8125,18 +7881,13 @@
           <a:p>
             <a:pPr algn="ctr"/>
             <a:r>
-              <a:rPr lang="fr-FR" sz="1000" dirty="0" err="1">
+              <a:rPr lang="fr-FR" sz="1000" dirty="0">
                 <a:solidFill>
                   <a:schemeClr val="tx1"/>
                 </a:solidFill>
               </a:rPr>
               <a:t>MesFrObservationBP</a:t>
             </a:r>
-            <a:endParaRPr lang="fr-FR" sz="1000" dirty="0">
-              <a:solidFill>
-                <a:schemeClr val="tx1"/>
-              </a:solidFill>
-            </a:endParaRPr>
           </a:p>
         </p:txBody>
       </p:sp>
@@ -8182,18 +7933,13 @@
           <a:p>
             <a:pPr algn="ctr"/>
             <a:r>
-              <a:rPr lang="fr-FR" sz="1000" dirty="0" err="1">
+              <a:rPr lang="fr-FR" sz="1000" dirty="0">
                 <a:solidFill>
                   <a:schemeClr val="tx1"/>
                 </a:solidFill>
               </a:rPr>
               <a:t>MesObservationGlucose</a:t>
             </a:r>
-            <a:endParaRPr lang="fr-FR" sz="1000" dirty="0">
-              <a:solidFill>
-                <a:schemeClr val="tx1"/>
-              </a:solidFill>
-            </a:endParaRPr>
           </a:p>
         </p:txBody>
       </p:sp>
@@ -8285,18 +8031,13 @@
           <a:p>
             <a:pPr algn="ctr"/>
             <a:r>
-              <a:rPr lang="fr-FR" sz="1000" dirty="0" err="1">
+              <a:rPr lang="fr-FR" sz="1000" dirty="0">
                 <a:solidFill>
                   <a:schemeClr val="tx1"/>
                 </a:solidFill>
               </a:rPr>
               <a:t>MesObservationHeadCircumference</a:t>
             </a:r>
-            <a:endParaRPr lang="fr-FR" sz="1000" dirty="0">
-              <a:solidFill>
-                <a:schemeClr val="tx1"/>
-              </a:solidFill>
-            </a:endParaRPr>
           </a:p>
         </p:txBody>
       </p:sp>
@@ -8436,7 +8177,7 @@
           <a:p>
             <a:pPr algn="ctr"/>
             <a:r>
-              <a:rPr lang="fr-FR" sz="1200" dirty="0" err="1"/>
+              <a:rPr lang="fr-FR" sz="1200" dirty="0"/>
               <a:t>MesBundleFluxAlimentation</a:t>
             </a:r>
             <a:endParaRPr lang="fr-FR" sz="1200" dirty="0">
@@ -8535,18 +8276,13 @@
           <a:p>
             <a:pPr algn="ctr"/>
             <a:r>
-              <a:rPr lang="fr-FR" sz="1200" dirty="0" err="1">
+              <a:rPr lang="fr-FR" sz="1200" dirty="0">
                 <a:solidFill>
                   <a:schemeClr val="tx1"/>
                 </a:solidFill>
               </a:rPr>
               <a:t>oxygensat</a:t>
             </a:r>
-            <a:endParaRPr lang="fr-FR" sz="1200" dirty="0">
-              <a:solidFill>
-                <a:schemeClr val="tx1"/>
-              </a:solidFill>
-            </a:endParaRPr>
           </a:p>
         </p:txBody>
       </p:sp>
@@ -8684,18 +8420,13 @@
           <a:p>
             <a:pPr algn="ctr"/>
             <a:r>
-              <a:rPr lang="fr-FR" sz="1200" dirty="0" err="1">
+              <a:rPr lang="fr-FR" sz="1200" dirty="0">
                 <a:solidFill>
                   <a:schemeClr val="tx1"/>
                 </a:solidFill>
               </a:rPr>
               <a:t>FrObservationOxygenSaturation</a:t>
             </a:r>
-            <a:endParaRPr lang="fr-FR" sz="1200" dirty="0">
-              <a:solidFill>
-                <a:schemeClr val="tx1"/>
-              </a:solidFill>
-            </a:endParaRPr>
           </a:p>
         </p:txBody>
       </p:sp>
@@ -8786,7 +8517,7 @@
           <a:p>
             <a:pPr algn="ctr"/>
             <a:r>
-              <a:rPr lang="fr-FR" sz="1000" dirty="0" err="1"/>
+              <a:rPr lang="fr-FR" sz="1000" dirty="0"/>
               <a:t>MesFrObservationOxygenSat</a:t>
             </a:r>
             <a:endParaRPr lang="fr-FR" sz="1000" dirty="0">
@@ -8839,18 +8570,13 @@
           <a:p>
             <a:pPr algn="ctr"/>
             <a:r>
-              <a:rPr lang="fr-FR" sz="1200" dirty="0" err="1">
+              <a:rPr lang="fr-FR" sz="1200" dirty="0">
                 <a:solidFill>
                   <a:schemeClr val="tx1"/>
                 </a:solidFill>
               </a:rPr>
               <a:t>resprate</a:t>
             </a:r>
-            <a:endParaRPr lang="fr-FR" sz="1200" dirty="0">
-              <a:solidFill>
-                <a:schemeClr val="tx1"/>
-              </a:solidFill>
-            </a:endParaRPr>
           </a:p>
         </p:txBody>
       </p:sp>
@@ -8896,18 +8622,13 @@
           <a:p>
             <a:pPr algn="ctr"/>
             <a:r>
-              <a:rPr lang="fr-FR" sz="1200" dirty="0" err="1">
+              <a:rPr lang="fr-FR" sz="1200" dirty="0">
                 <a:solidFill>
                   <a:schemeClr val="tx1"/>
                 </a:solidFill>
               </a:rPr>
               <a:t>FrOservationRespRate</a:t>
             </a:r>
-            <a:endParaRPr lang="fr-FR" sz="1200" dirty="0">
-              <a:solidFill>
-                <a:schemeClr val="tx1"/>
-              </a:solidFill>
-            </a:endParaRPr>
           </a:p>
         </p:txBody>
       </p:sp>
@@ -8953,7 +8674,7 @@
           <a:p>
             <a:pPr algn="ctr"/>
             <a:r>
-              <a:rPr lang="fr-FR" sz="1000" dirty="0" err="1"/>
+              <a:rPr lang="fr-FR" sz="1000" dirty="0"/>
               <a:t>MesFrObservationRespiratoryRate</a:t>
             </a:r>
             <a:endParaRPr lang="fr-FR" sz="1000" dirty="0">

</xml_diff>

<commit_message>
[Narratif] Mise à jour du schéma des ressources et du nom des pages (#97)
* update schema

* rm .age

* rm useless file and push sushi-config

* rm useless pages

* update image

* update image size and add english descr and ci-sis logo

* add ci-sis logo and fix typos

* complete name

* update figure size

* update image style

* rm useless image

* update sushi config

* add link to current version
</commit_message>
<xml_diff>
--- a/input/images-source/Schema liens ressources profil.pptx
+++ b/input/images-source/Schema liens ressources profil.pptx
@@ -6,8 +6,9 @@
   </p:sldMasterIdLst>
   <p:sldIdLst>
     <p:sldId id="256" r:id="rId2"/>
-    <p:sldId id="257" r:id="rId3"/>
-    <p:sldId id="258" r:id="rId4"/>
+    <p:sldId id="260" r:id="rId3"/>
+    <p:sldId id="259" r:id="rId4"/>
+    <p:sldId id="258" r:id="rId5"/>
   </p:sldIdLst>
   <p:sldSz cx="9144000" cy="6858000" type="screen4x3"/>
   <p:notesSz cx="6858000" cy="9144000"/>
@@ -304,7 +305,7 @@
           <a:p>
             <a:fld id="{EBE2072C-2E5B-4DAA-A536-4DE5E5AE4199}" type="datetimeFigureOut">
               <a:rPr lang="fr-FR" smtClean="0"/>
-              <a:t>26/01/2023</a:t>
+              <a:t>01/02/2024</a:t>
             </a:fld>
             <a:endParaRPr lang="fr-FR"/>
           </a:p>
@@ -472,7 +473,7 @@
           <a:p>
             <a:fld id="{EBE2072C-2E5B-4DAA-A536-4DE5E5AE4199}" type="datetimeFigureOut">
               <a:rPr lang="fr-FR" smtClean="0"/>
-              <a:t>26/01/2023</a:t>
+              <a:t>01/02/2024</a:t>
             </a:fld>
             <a:endParaRPr lang="fr-FR"/>
           </a:p>
@@ -650,7 +651,7 @@
           <a:p>
             <a:fld id="{EBE2072C-2E5B-4DAA-A536-4DE5E5AE4199}" type="datetimeFigureOut">
               <a:rPr lang="fr-FR" smtClean="0"/>
-              <a:t>26/01/2023</a:t>
+              <a:t>01/02/2024</a:t>
             </a:fld>
             <a:endParaRPr lang="fr-FR"/>
           </a:p>
@@ -818,7 +819,7 @@
           <a:p>
             <a:fld id="{EBE2072C-2E5B-4DAA-A536-4DE5E5AE4199}" type="datetimeFigureOut">
               <a:rPr lang="fr-FR" smtClean="0"/>
-              <a:t>26/01/2023</a:t>
+              <a:t>01/02/2024</a:t>
             </a:fld>
             <a:endParaRPr lang="fr-FR"/>
           </a:p>
@@ -1063,7 +1064,7 @@
           <a:p>
             <a:fld id="{EBE2072C-2E5B-4DAA-A536-4DE5E5AE4199}" type="datetimeFigureOut">
               <a:rPr lang="fr-FR" smtClean="0"/>
-              <a:t>26/01/2023</a:t>
+              <a:t>01/02/2024</a:t>
             </a:fld>
             <a:endParaRPr lang="fr-FR"/>
           </a:p>
@@ -1348,7 +1349,7 @@
           <a:p>
             <a:fld id="{EBE2072C-2E5B-4DAA-A536-4DE5E5AE4199}" type="datetimeFigureOut">
               <a:rPr lang="fr-FR" smtClean="0"/>
-              <a:t>26/01/2023</a:t>
+              <a:t>01/02/2024</a:t>
             </a:fld>
             <a:endParaRPr lang="fr-FR"/>
           </a:p>
@@ -1767,7 +1768,7 @@
           <a:p>
             <a:fld id="{EBE2072C-2E5B-4DAA-A536-4DE5E5AE4199}" type="datetimeFigureOut">
               <a:rPr lang="fr-FR" smtClean="0"/>
-              <a:t>26/01/2023</a:t>
+              <a:t>01/02/2024</a:t>
             </a:fld>
             <a:endParaRPr lang="fr-FR"/>
           </a:p>
@@ -1884,7 +1885,7 @@
           <a:p>
             <a:fld id="{EBE2072C-2E5B-4DAA-A536-4DE5E5AE4199}" type="datetimeFigureOut">
               <a:rPr lang="fr-FR" smtClean="0"/>
-              <a:t>26/01/2023</a:t>
+              <a:t>01/02/2024</a:t>
             </a:fld>
             <a:endParaRPr lang="fr-FR"/>
           </a:p>
@@ -1979,7 +1980,7 @@
           <a:p>
             <a:fld id="{EBE2072C-2E5B-4DAA-A536-4DE5E5AE4199}" type="datetimeFigureOut">
               <a:rPr lang="fr-FR" smtClean="0"/>
-              <a:t>26/01/2023</a:t>
+              <a:t>01/02/2024</a:t>
             </a:fld>
             <a:endParaRPr lang="fr-FR"/>
           </a:p>
@@ -2254,7 +2255,7 @@
           <a:p>
             <a:fld id="{EBE2072C-2E5B-4DAA-A536-4DE5E5AE4199}" type="datetimeFigureOut">
               <a:rPr lang="fr-FR" smtClean="0"/>
-              <a:t>26/01/2023</a:t>
+              <a:t>01/02/2024</a:t>
             </a:fld>
             <a:endParaRPr lang="fr-FR"/>
           </a:p>
@@ -2506,7 +2507,7 @@
           <a:p>
             <a:fld id="{EBE2072C-2E5B-4DAA-A536-4DE5E5AE4199}" type="datetimeFigureOut">
               <a:rPr lang="fr-FR" smtClean="0"/>
-              <a:t>26/01/2023</a:t>
+              <a:t>01/02/2024</a:t>
             </a:fld>
             <a:endParaRPr lang="fr-FR"/>
           </a:p>
@@ -2717,7 +2718,7 @@
           <a:p>
             <a:fld id="{EBE2072C-2E5B-4DAA-A536-4DE5E5AE4199}" type="datetimeFigureOut">
               <a:rPr lang="fr-FR" smtClean="0"/>
-              <a:t>26/01/2023</a:t>
+              <a:t>01/02/2024</a:t>
             </a:fld>
             <a:endParaRPr lang="fr-FR"/>
           </a:p>
@@ -3259,26 +3260,13 @@
           <a:p>
             <a:pPr algn="ctr"/>
             <a:r>
-              <a:rPr lang="fr-FR" sz="1200">
+              <a:rPr lang="fr-FR" sz="1200" dirty="0">
                 <a:solidFill>
                   <a:schemeClr val="tx1"/>
                 </a:solidFill>
               </a:rPr>
-              <a:t>Profils </a:t>
-            </a:r>
-            <a:r>
-              <a:rPr lang="fr-FR" sz="1200" err="1">
-                <a:solidFill>
-                  <a:schemeClr val="tx1"/>
-                </a:solidFill>
-              </a:rPr>
-              <a:t>InteropSanté</a:t>
-            </a:r>
-            <a:endParaRPr lang="fr-FR" sz="1200">
-              <a:solidFill>
-                <a:schemeClr val="tx1"/>
-              </a:solidFill>
-            </a:endParaRPr>
+              <a:t>Profils InteropSanté</a:t>
+            </a:r>
           </a:p>
         </p:txBody>
       </p:sp>
@@ -3652,18 +3640,13 @@
           <a:p>
             <a:pPr algn="ctr"/>
             <a:r>
-              <a:rPr lang="fr-FR" sz="1200" err="1">
+              <a:rPr lang="fr-FR" sz="1200" dirty="0">
                 <a:solidFill>
                   <a:schemeClr val="tx1"/>
                 </a:solidFill>
               </a:rPr>
               <a:t>bmi</a:t>
             </a:r>
-            <a:endParaRPr lang="fr-FR" sz="1200">
-              <a:solidFill>
-                <a:schemeClr val="tx1"/>
-              </a:solidFill>
-            </a:endParaRPr>
           </a:p>
         </p:txBody>
       </p:sp>
@@ -3703,18 +3686,13 @@
           <a:p>
             <a:pPr algn="ctr"/>
             <a:r>
-              <a:rPr lang="fr-FR" sz="1200" err="1">
+              <a:rPr lang="fr-FR" sz="1200" dirty="0">
                 <a:solidFill>
                   <a:schemeClr val="tx1"/>
                 </a:solidFill>
               </a:rPr>
               <a:t>heartrate</a:t>
             </a:r>
-            <a:endParaRPr lang="fr-FR" sz="1200">
-              <a:solidFill>
-                <a:schemeClr val="tx1"/>
-              </a:solidFill>
-            </a:endParaRPr>
           </a:p>
         </p:txBody>
       </p:sp>
@@ -3754,18 +3732,13 @@
           <a:p>
             <a:pPr algn="ctr"/>
             <a:r>
-              <a:rPr lang="fr-FR" sz="1200" err="1">
+              <a:rPr lang="fr-FR" sz="1200" dirty="0">
                 <a:solidFill>
                   <a:schemeClr val="tx1"/>
                 </a:solidFill>
               </a:rPr>
               <a:t>bodyweight</a:t>
             </a:r>
-            <a:endParaRPr lang="fr-FR" sz="1200">
-              <a:solidFill>
-                <a:schemeClr val="tx1"/>
-              </a:solidFill>
-            </a:endParaRPr>
           </a:p>
         </p:txBody>
       </p:sp>
@@ -3805,18 +3778,13 @@
           <a:p>
             <a:pPr algn="ctr"/>
             <a:r>
-              <a:rPr lang="fr-FR" sz="1200" err="1">
+              <a:rPr lang="fr-FR" sz="1200" dirty="0">
                 <a:solidFill>
                   <a:schemeClr val="tx1"/>
                 </a:solidFill>
               </a:rPr>
               <a:t>bodyheight</a:t>
             </a:r>
-            <a:endParaRPr lang="fr-FR" sz="1200">
-              <a:solidFill>
-                <a:schemeClr val="tx1"/>
-              </a:solidFill>
-            </a:endParaRPr>
           </a:p>
         </p:txBody>
       </p:sp>
@@ -3856,18 +3824,13 @@
           <a:p>
             <a:pPr algn="ctr"/>
             <a:r>
-              <a:rPr lang="fr-FR" sz="1200" err="1">
+              <a:rPr lang="fr-FR" sz="1200" dirty="0">
                 <a:solidFill>
                   <a:schemeClr val="tx1"/>
                 </a:solidFill>
               </a:rPr>
               <a:t>bodytemperature</a:t>
             </a:r>
-            <a:endParaRPr lang="fr-FR" sz="1200">
-              <a:solidFill>
-                <a:schemeClr val="tx1"/>
-              </a:solidFill>
-            </a:endParaRPr>
           </a:p>
         </p:txBody>
       </p:sp>
@@ -4087,18 +4050,13 @@
           <a:p>
             <a:pPr algn="ctr"/>
             <a:r>
-              <a:rPr lang="fr-FR" sz="1200" dirty="0" err="1">
+              <a:rPr lang="fr-FR" sz="1200" dirty="0">
                 <a:solidFill>
                   <a:schemeClr val="tx1"/>
                 </a:solidFill>
               </a:rPr>
               <a:t>FrObservationBmi</a:t>
             </a:r>
-            <a:endParaRPr lang="fr-FR" sz="1200" dirty="0">
-              <a:solidFill>
-                <a:schemeClr val="tx1"/>
-              </a:solidFill>
-            </a:endParaRPr>
           </a:p>
         </p:txBody>
       </p:sp>
@@ -4138,18 +4096,13 @@
           <a:p>
             <a:pPr algn="ctr"/>
             <a:r>
-              <a:rPr lang="fr-FR" sz="1200" err="1">
+              <a:rPr lang="fr-FR" sz="1200" dirty="0">
                 <a:solidFill>
                   <a:schemeClr val="tx1"/>
                 </a:solidFill>
               </a:rPr>
               <a:t>FrObservationHeartrate</a:t>
             </a:r>
-            <a:endParaRPr lang="fr-FR" sz="1200">
-              <a:solidFill>
-                <a:schemeClr val="tx1"/>
-              </a:solidFill>
-            </a:endParaRPr>
           </a:p>
         </p:txBody>
       </p:sp>
@@ -4189,18 +4142,13 @@
           <a:p>
             <a:pPr algn="ctr"/>
             <a:r>
-              <a:rPr lang="fr-FR" sz="1200" err="1">
+              <a:rPr lang="fr-FR" sz="1200" dirty="0">
                 <a:solidFill>
                   <a:schemeClr val="tx1"/>
                 </a:solidFill>
               </a:rPr>
               <a:t>FrObservationBodyWeight</a:t>
             </a:r>
-            <a:endParaRPr lang="fr-FR" sz="1200">
-              <a:solidFill>
-                <a:schemeClr val="tx1"/>
-              </a:solidFill>
-            </a:endParaRPr>
           </a:p>
         </p:txBody>
       </p:sp>
@@ -4240,18 +4188,13 @@
           <a:p>
             <a:pPr algn="ctr"/>
             <a:r>
-              <a:rPr lang="fr-FR" sz="1200" err="1">
+              <a:rPr lang="fr-FR" sz="1200" dirty="0">
                 <a:solidFill>
                   <a:schemeClr val="tx1"/>
                 </a:solidFill>
               </a:rPr>
               <a:t>FrObservationBodyHeight</a:t>
             </a:r>
-            <a:endParaRPr lang="fr-FR" sz="1200">
-              <a:solidFill>
-                <a:schemeClr val="tx1"/>
-              </a:solidFill>
-            </a:endParaRPr>
           </a:p>
         </p:txBody>
       </p:sp>
@@ -4291,18 +4234,13 @@
           <a:p>
             <a:pPr algn="ctr"/>
             <a:r>
-              <a:rPr lang="fr-FR" sz="1200" err="1">
+              <a:rPr lang="fr-FR" sz="1200" dirty="0">
                 <a:solidFill>
                   <a:schemeClr val="tx1"/>
                 </a:solidFill>
               </a:rPr>
               <a:t>FrObservationBodyTemperature</a:t>
             </a:r>
-            <a:endParaRPr lang="fr-FR" sz="1200">
-              <a:solidFill>
-                <a:schemeClr val="tx1"/>
-              </a:solidFill>
-            </a:endParaRPr>
           </a:p>
         </p:txBody>
       </p:sp>
@@ -4522,18 +4460,13 @@
           <a:p>
             <a:pPr algn="ctr"/>
             <a:r>
-              <a:rPr lang="fr-FR" sz="1000" dirty="0" err="1">
+              <a:rPr lang="fr-FR" sz="1000" dirty="0">
                 <a:solidFill>
                   <a:schemeClr val="tx1"/>
                 </a:solidFill>
               </a:rPr>
               <a:t>MesFrObservationBmi</a:t>
             </a:r>
-            <a:endParaRPr lang="fr-FR" sz="1000" dirty="0">
-              <a:solidFill>
-                <a:schemeClr val="tx1"/>
-              </a:solidFill>
-            </a:endParaRPr>
           </a:p>
         </p:txBody>
       </p:sp>
@@ -4573,18 +4506,13 @@
           <a:p>
             <a:pPr algn="ctr"/>
             <a:r>
-              <a:rPr lang="fr-FR" sz="1000" dirty="0" err="1">
+              <a:rPr lang="fr-FR" sz="1000" dirty="0">
                 <a:solidFill>
                   <a:schemeClr val="tx1"/>
                 </a:solidFill>
               </a:rPr>
               <a:t>MesFrObservationHeartrate</a:t>
             </a:r>
-            <a:endParaRPr lang="fr-FR" sz="1000" dirty="0">
-              <a:solidFill>
-                <a:schemeClr val="tx1"/>
-              </a:solidFill>
-            </a:endParaRPr>
           </a:p>
         </p:txBody>
       </p:sp>
@@ -4624,18 +4552,13 @@
           <a:p>
             <a:pPr algn="ctr"/>
             <a:r>
-              <a:rPr lang="fr-FR" sz="1000" dirty="0" err="1">
+              <a:rPr lang="fr-FR" sz="1000" dirty="0">
                 <a:solidFill>
                   <a:schemeClr val="tx1"/>
                 </a:solidFill>
               </a:rPr>
               <a:t>MesFrObservationBodyWeight</a:t>
             </a:r>
-            <a:endParaRPr lang="fr-FR" sz="1000" dirty="0">
-              <a:solidFill>
-                <a:schemeClr val="tx1"/>
-              </a:solidFill>
-            </a:endParaRPr>
           </a:p>
         </p:txBody>
       </p:sp>
@@ -4675,18 +4598,13 @@
           <a:p>
             <a:pPr algn="ctr"/>
             <a:r>
-              <a:rPr lang="fr-FR" sz="1000" dirty="0" err="1">
+              <a:rPr lang="fr-FR" sz="1000" dirty="0">
                 <a:solidFill>
                   <a:schemeClr val="tx1"/>
                 </a:solidFill>
               </a:rPr>
               <a:t>MesFrObservationBodyHeight</a:t>
             </a:r>
-            <a:endParaRPr lang="fr-FR" sz="1000" dirty="0">
-              <a:solidFill>
-                <a:schemeClr val="tx1"/>
-              </a:solidFill>
-            </a:endParaRPr>
           </a:p>
         </p:txBody>
       </p:sp>
@@ -4726,18 +4644,13 @@
           <a:p>
             <a:pPr algn="ctr"/>
             <a:r>
-              <a:rPr lang="fr-FR" sz="1000" dirty="0" err="1">
+              <a:rPr lang="fr-FR" sz="1000" dirty="0">
                 <a:solidFill>
                   <a:schemeClr val="tx1"/>
                 </a:solidFill>
               </a:rPr>
               <a:t>MesFrObservationBodyTemperature</a:t>
             </a:r>
-            <a:endParaRPr lang="fr-FR" sz="1000" dirty="0">
-              <a:solidFill>
-                <a:schemeClr val="tx1"/>
-              </a:solidFill>
-            </a:endParaRPr>
           </a:p>
         </p:txBody>
       </p:sp>
@@ -4823,18 +4736,13 @@
           <a:p>
             <a:pPr algn="ctr"/>
             <a:r>
-              <a:rPr lang="fr-FR" sz="1000" dirty="0" err="1">
+              <a:rPr lang="fr-FR" sz="1000" dirty="0">
                 <a:solidFill>
                   <a:schemeClr val="tx1"/>
                 </a:solidFill>
               </a:rPr>
               <a:t>MesObservationStepsByDay</a:t>
             </a:r>
-            <a:endParaRPr lang="fr-FR" sz="1000" dirty="0">
-              <a:solidFill>
-                <a:schemeClr val="tx1"/>
-              </a:solidFill>
-            </a:endParaRPr>
           </a:p>
         </p:txBody>
       </p:sp>
@@ -4874,18 +4782,13 @@
           <a:p>
             <a:pPr algn="ctr"/>
             <a:r>
-              <a:rPr lang="fr-FR" sz="1000" dirty="0" err="1">
+              <a:rPr lang="fr-FR" sz="1000" dirty="0">
                 <a:solidFill>
                   <a:schemeClr val="tx1"/>
                 </a:solidFill>
               </a:rPr>
               <a:t>MesObservationPainSeverity</a:t>
             </a:r>
-            <a:endParaRPr lang="fr-FR" sz="1000" dirty="0">
-              <a:solidFill>
-                <a:schemeClr val="tx1"/>
-              </a:solidFill>
-            </a:endParaRPr>
           </a:p>
         </p:txBody>
       </p:sp>
@@ -4925,18 +4828,13 @@
           <a:p>
             <a:pPr algn="ctr"/>
             <a:r>
-              <a:rPr lang="fr-FR" sz="1000" dirty="0" err="1">
+              <a:rPr lang="fr-FR" sz="1000" dirty="0">
                 <a:solidFill>
                   <a:schemeClr val="tx1"/>
                 </a:solidFill>
               </a:rPr>
               <a:t>MesObservationWaistCircumference</a:t>
             </a:r>
-            <a:endParaRPr lang="fr-FR" sz="1000" dirty="0">
-              <a:solidFill>
-                <a:schemeClr val="tx1"/>
-              </a:solidFill>
-            </a:endParaRPr>
           </a:p>
         </p:txBody>
       </p:sp>
@@ -4976,18 +4874,13 @@
           <a:p>
             <a:pPr algn="ctr"/>
             <a:r>
-              <a:rPr lang="fr-FR" sz="1200" err="1">
+              <a:rPr lang="fr-FR" sz="1200" dirty="0">
                 <a:solidFill>
                   <a:schemeClr val="tx1"/>
                 </a:solidFill>
               </a:rPr>
               <a:t>bloodpressure</a:t>
             </a:r>
-            <a:endParaRPr lang="fr-FR" sz="1200">
-              <a:solidFill>
-                <a:schemeClr val="tx1"/>
-              </a:solidFill>
-            </a:endParaRPr>
           </a:p>
         </p:txBody>
       </p:sp>
@@ -5346,18 +5239,13 @@
           <a:p>
             <a:pPr algn="ctr"/>
             <a:r>
-              <a:rPr lang="fr-FR" sz="1000" dirty="0" err="1">
+              <a:rPr lang="fr-FR" sz="1000" dirty="0">
                 <a:solidFill>
                   <a:schemeClr val="tx1"/>
                 </a:solidFill>
               </a:rPr>
               <a:t>MesFrObservationBP</a:t>
             </a:r>
-            <a:endParaRPr lang="fr-FR" sz="1000" dirty="0">
-              <a:solidFill>
-                <a:schemeClr val="tx1"/>
-              </a:solidFill>
-            </a:endParaRPr>
           </a:p>
         </p:txBody>
       </p:sp>
@@ -5403,18 +5291,13 @@
           <a:p>
             <a:pPr algn="ctr"/>
             <a:r>
-              <a:rPr lang="fr-FR" sz="1000" dirty="0" err="1">
+              <a:rPr lang="fr-FR" sz="1000" dirty="0">
                 <a:solidFill>
                   <a:schemeClr val="tx1"/>
                 </a:solidFill>
               </a:rPr>
               <a:t>MesObservationGlucose</a:t>
             </a:r>
-            <a:endParaRPr lang="fr-FR" sz="1000" dirty="0">
-              <a:solidFill>
-                <a:schemeClr val="tx1"/>
-              </a:solidFill>
-            </a:endParaRPr>
           </a:p>
         </p:txBody>
       </p:sp>
@@ -5506,18 +5389,13 @@
           <a:p>
             <a:pPr algn="ctr"/>
             <a:r>
-              <a:rPr lang="fr-FR" sz="1000" dirty="0" err="1">
+              <a:rPr lang="fr-FR" sz="1000" dirty="0">
                 <a:solidFill>
                   <a:schemeClr val="tx1"/>
                 </a:solidFill>
               </a:rPr>
               <a:t>MesObservationHeadCircumference</a:t>
             </a:r>
-            <a:endParaRPr lang="fr-FR" sz="1000" dirty="0">
-              <a:solidFill>
-                <a:schemeClr val="tx1"/>
-              </a:solidFill>
-            </a:endParaRPr>
           </a:p>
         </p:txBody>
       </p:sp>
@@ -5585,7 +5463,3391 @@
   <p:cSld>
     <p:spTree>
       <p:nvGrpSpPr>
-        <p:cNvPr id="1" name=""/>
+        <p:cNvPr id="1" name="">
+          <a:extLst>
+            <a:ext uri="{FF2B5EF4-FFF2-40B4-BE49-F238E27FC236}">
+              <a16:creationId xmlns:a16="http://schemas.microsoft.com/office/drawing/2014/main" id="{2B02C910-4523-3594-A019-1CB2CABD1B1F}"/>
+            </a:ext>
+          </a:extLst>
+        </p:cNvPr>
+        <p:cNvGrpSpPr/>
+        <p:nvPr/>
+      </p:nvGrpSpPr>
+      <p:grpSpPr>
+        <a:xfrm>
+          <a:off x="0" y="0"/>
+          <a:ext cx="0" cy="0"/>
+          <a:chOff x="0" y="0"/>
+          <a:chExt cx="0" cy="0"/>
+        </a:xfrm>
+      </p:grpSpPr>
+      <p:sp>
+        <p:nvSpPr>
+          <p:cNvPr id="4" name="Rectangle à coins arrondis 3">
+            <a:extLst>
+              <a:ext uri="{FF2B5EF4-FFF2-40B4-BE49-F238E27FC236}">
+                <a16:creationId xmlns:a16="http://schemas.microsoft.com/office/drawing/2014/main" id="{19DBC244-6C52-B9C1-7830-DEBBDF0EE03B}"/>
+              </a:ext>
+            </a:extLst>
+          </p:cNvPr>
+          <p:cNvSpPr/>
+          <p:nvPr/>
+        </p:nvSpPr>
+        <p:spPr>
+          <a:xfrm>
+            <a:off x="166890" y="116632"/>
+            <a:ext cx="1449050" cy="1021976"/>
+          </a:xfrm>
+          <a:prstGeom prst="roundRect">
+            <a:avLst/>
+          </a:prstGeom>
+        </p:spPr>
+        <p:style>
+          <a:lnRef idx="2">
+            <a:schemeClr val="accent1">
+              <a:shade val="50000"/>
+            </a:schemeClr>
+          </a:lnRef>
+          <a:fillRef idx="1">
+            <a:schemeClr val="accent1"/>
+          </a:fillRef>
+          <a:effectRef idx="0">
+            <a:schemeClr val="accent1"/>
+          </a:effectRef>
+          <a:fontRef idx="minor">
+            <a:schemeClr val="lt1"/>
+          </a:fontRef>
+        </p:style>
+        <p:txBody>
+          <a:bodyPr rtlCol="0" anchor="ctr"/>
+          <a:lstStyle/>
+          <a:p>
+            <a:pPr algn="ctr"/>
+            <a:r>
+              <a:rPr lang="fr-FR" dirty="0"/>
+              <a:t>Observation</a:t>
+            </a:r>
+          </a:p>
+        </p:txBody>
+      </p:sp>
+      <p:sp>
+        <p:nvSpPr>
+          <p:cNvPr id="5" name="Rectangle à coins arrondis 4">
+            <a:extLst>
+              <a:ext uri="{FF2B5EF4-FFF2-40B4-BE49-F238E27FC236}">
+                <a16:creationId xmlns:a16="http://schemas.microsoft.com/office/drawing/2014/main" id="{47AD8BA2-C1E8-AE47-45DB-42A96B916C6B}"/>
+              </a:ext>
+            </a:extLst>
+          </p:cNvPr>
+          <p:cNvSpPr/>
+          <p:nvPr/>
+        </p:nvSpPr>
+        <p:spPr>
+          <a:xfrm>
+            <a:off x="6869913" y="220250"/>
+            <a:ext cx="2043952" cy="251012"/>
+          </a:xfrm>
+          <a:prstGeom prst="roundRect">
+            <a:avLst/>
+          </a:prstGeom>
+        </p:spPr>
+        <p:style>
+          <a:lnRef idx="2">
+            <a:schemeClr val="accent1">
+              <a:shade val="50000"/>
+            </a:schemeClr>
+          </a:lnRef>
+          <a:fillRef idx="1">
+            <a:schemeClr val="accent1"/>
+          </a:fillRef>
+          <a:effectRef idx="0">
+            <a:schemeClr val="accent1"/>
+          </a:effectRef>
+          <a:fontRef idx="minor">
+            <a:schemeClr val="lt1"/>
+          </a:fontRef>
+        </p:style>
+        <p:txBody>
+          <a:bodyPr rtlCol="0" anchor="ctr"/>
+          <a:lstStyle/>
+          <a:p>
+            <a:pPr algn="ctr"/>
+            <a:r>
+              <a:rPr lang="fr-FR" sz="1200"/>
+              <a:t>Ressources FHIR</a:t>
+            </a:r>
+          </a:p>
+        </p:txBody>
+      </p:sp>
+      <p:sp>
+        <p:nvSpPr>
+          <p:cNvPr id="6" name="Rectangle à coins arrondis 5">
+            <a:extLst>
+              <a:ext uri="{FF2B5EF4-FFF2-40B4-BE49-F238E27FC236}">
+                <a16:creationId xmlns:a16="http://schemas.microsoft.com/office/drawing/2014/main" id="{C9D492AB-0E5E-E60B-8F78-4A3E464FAE1A}"/>
+              </a:ext>
+            </a:extLst>
+          </p:cNvPr>
+          <p:cNvSpPr/>
+          <p:nvPr/>
+        </p:nvSpPr>
+        <p:spPr>
+          <a:xfrm>
+            <a:off x="6869913" y="542977"/>
+            <a:ext cx="2043952" cy="251012"/>
+          </a:xfrm>
+          <a:prstGeom prst="roundRect">
+            <a:avLst/>
+          </a:prstGeom>
+        </p:spPr>
+        <p:style>
+          <a:lnRef idx="1">
+            <a:schemeClr val="accent1"/>
+          </a:lnRef>
+          <a:fillRef idx="2">
+            <a:schemeClr val="accent1"/>
+          </a:fillRef>
+          <a:effectRef idx="1">
+            <a:schemeClr val="accent1"/>
+          </a:effectRef>
+          <a:fontRef idx="minor">
+            <a:schemeClr val="dk1"/>
+          </a:fontRef>
+        </p:style>
+        <p:txBody>
+          <a:bodyPr rtlCol="0" anchor="ctr"/>
+          <a:lstStyle/>
+          <a:p>
+            <a:pPr algn="ctr"/>
+            <a:r>
+              <a:rPr lang="fr-FR" sz="1200">
+                <a:solidFill>
+                  <a:schemeClr val="tx1"/>
+                </a:solidFill>
+              </a:rPr>
+              <a:t>Profils FHIR</a:t>
+            </a:r>
+          </a:p>
+        </p:txBody>
+      </p:sp>
+      <p:sp>
+        <p:nvSpPr>
+          <p:cNvPr id="7" name="Rectangle à coins arrondis 6">
+            <a:extLst>
+              <a:ext uri="{FF2B5EF4-FFF2-40B4-BE49-F238E27FC236}">
+                <a16:creationId xmlns:a16="http://schemas.microsoft.com/office/drawing/2014/main" id="{83EE8A50-DB17-8BEB-8825-03B1913D7D24}"/>
+              </a:ext>
+            </a:extLst>
+          </p:cNvPr>
+          <p:cNvSpPr/>
+          <p:nvPr/>
+        </p:nvSpPr>
+        <p:spPr>
+          <a:xfrm>
+            <a:off x="6869913" y="865704"/>
+            <a:ext cx="2043952" cy="251012"/>
+          </a:xfrm>
+          <a:prstGeom prst="roundRect">
+            <a:avLst/>
+          </a:prstGeom>
+          <a:ln/>
+        </p:spPr>
+        <p:style>
+          <a:lnRef idx="1">
+            <a:schemeClr val="accent4"/>
+          </a:lnRef>
+          <a:fillRef idx="2">
+            <a:schemeClr val="accent4"/>
+          </a:fillRef>
+          <a:effectRef idx="1">
+            <a:schemeClr val="accent4"/>
+          </a:effectRef>
+          <a:fontRef idx="minor">
+            <a:schemeClr val="dk1"/>
+          </a:fontRef>
+        </p:style>
+        <p:txBody>
+          <a:bodyPr rtlCol="0" anchor="ctr"/>
+          <a:lstStyle/>
+          <a:p>
+            <a:pPr algn="ctr"/>
+            <a:r>
+              <a:rPr lang="fr-FR" sz="1200" dirty="0">
+                <a:solidFill>
+                  <a:schemeClr val="tx1"/>
+                </a:solidFill>
+              </a:rPr>
+              <a:t>Profils InteropSanté</a:t>
+            </a:r>
+          </a:p>
+        </p:txBody>
+      </p:sp>
+      <p:sp>
+        <p:nvSpPr>
+          <p:cNvPr id="8" name="Rectangle à coins arrondis 7">
+            <a:extLst>
+              <a:ext uri="{FF2B5EF4-FFF2-40B4-BE49-F238E27FC236}">
+                <a16:creationId xmlns:a16="http://schemas.microsoft.com/office/drawing/2014/main" id="{1D8C9727-7DC5-BB2C-8286-07F554FC2155}"/>
+              </a:ext>
+            </a:extLst>
+          </p:cNvPr>
+          <p:cNvSpPr/>
+          <p:nvPr/>
+        </p:nvSpPr>
+        <p:spPr>
+          <a:xfrm>
+            <a:off x="162301" y="1347831"/>
+            <a:ext cx="1453639" cy="277906"/>
+          </a:xfrm>
+          <a:prstGeom prst="roundRect">
+            <a:avLst/>
+          </a:prstGeom>
+        </p:spPr>
+        <p:style>
+          <a:lnRef idx="1">
+            <a:schemeClr val="accent1"/>
+          </a:lnRef>
+          <a:fillRef idx="2">
+            <a:schemeClr val="accent1"/>
+          </a:fillRef>
+          <a:effectRef idx="1">
+            <a:schemeClr val="accent1"/>
+          </a:effectRef>
+          <a:fontRef idx="minor">
+            <a:schemeClr val="dk1"/>
+          </a:fontRef>
+        </p:style>
+        <p:txBody>
+          <a:bodyPr rtlCol="0" anchor="ctr"/>
+          <a:lstStyle/>
+          <a:p>
+            <a:pPr algn="ctr"/>
+            <a:r>
+              <a:rPr lang="fr-FR" sz="1200" dirty="0">
+                <a:solidFill>
+                  <a:schemeClr val="tx1"/>
+                </a:solidFill>
+              </a:rPr>
+              <a:t>Vital-signs</a:t>
+            </a:r>
+          </a:p>
+        </p:txBody>
+      </p:sp>
+      <p:cxnSp>
+        <p:nvCxnSpPr>
+          <p:cNvPr id="9" name="Connecteur droit avec flèche 8">
+            <a:extLst>
+              <a:ext uri="{FF2B5EF4-FFF2-40B4-BE49-F238E27FC236}">
+                <a16:creationId xmlns:a16="http://schemas.microsoft.com/office/drawing/2014/main" id="{CDF052EF-E713-334A-D91E-9625D64DBBDA}"/>
+              </a:ext>
+            </a:extLst>
+          </p:cNvPr>
+          <p:cNvCxnSpPr>
+            <a:stCxn id="4" idx="2"/>
+            <a:endCxn id="8" idx="0"/>
+          </p:cNvCxnSpPr>
+          <p:nvPr/>
+        </p:nvCxnSpPr>
+        <p:spPr>
+          <a:xfrm flipH="1">
+            <a:off x="889121" y="1138608"/>
+            <a:ext cx="2294" cy="209223"/>
+          </a:xfrm>
+          <a:prstGeom prst="straightConnector1">
+            <a:avLst/>
+          </a:prstGeom>
+          <a:ln>
+            <a:solidFill>
+              <a:schemeClr val="tx1"/>
+            </a:solidFill>
+            <a:tailEnd type="triangle"/>
+          </a:ln>
+        </p:spPr>
+        <p:style>
+          <a:lnRef idx="1">
+            <a:schemeClr val="accent1"/>
+          </a:lnRef>
+          <a:fillRef idx="0">
+            <a:schemeClr val="accent1"/>
+          </a:fillRef>
+          <a:effectRef idx="0">
+            <a:schemeClr val="accent1"/>
+          </a:effectRef>
+          <a:fontRef idx="minor">
+            <a:schemeClr val="tx1"/>
+          </a:fontRef>
+        </p:style>
+      </p:cxnSp>
+      <p:cxnSp>
+        <p:nvCxnSpPr>
+          <p:cNvPr id="10" name="Connecteur droit 9">
+            <a:extLst>
+              <a:ext uri="{FF2B5EF4-FFF2-40B4-BE49-F238E27FC236}">
+                <a16:creationId xmlns:a16="http://schemas.microsoft.com/office/drawing/2014/main" id="{FD638054-3FB2-E9DE-065C-304A06680E6C}"/>
+              </a:ext>
+            </a:extLst>
+          </p:cNvPr>
+          <p:cNvCxnSpPr>
+            <a:cxnSpLocks/>
+            <a:stCxn id="8" idx="2"/>
+          </p:cNvCxnSpPr>
+          <p:nvPr/>
+        </p:nvCxnSpPr>
+        <p:spPr>
+          <a:xfrm>
+            <a:off x="889121" y="1625737"/>
+            <a:ext cx="2294" cy="2405635"/>
+          </a:xfrm>
+          <a:prstGeom prst="line">
+            <a:avLst/>
+          </a:prstGeom>
+          <a:ln>
+            <a:solidFill>
+              <a:schemeClr val="tx1"/>
+            </a:solidFill>
+          </a:ln>
+        </p:spPr>
+        <p:style>
+          <a:lnRef idx="1">
+            <a:schemeClr val="accent1"/>
+          </a:lnRef>
+          <a:fillRef idx="0">
+            <a:schemeClr val="accent1"/>
+          </a:fillRef>
+          <a:effectRef idx="0">
+            <a:schemeClr val="accent1"/>
+          </a:effectRef>
+          <a:fontRef idx="minor">
+            <a:schemeClr val="tx1"/>
+          </a:fontRef>
+        </p:style>
+      </p:cxnSp>
+      <p:cxnSp>
+        <p:nvCxnSpPr>
+          <p:cNvPr id="11" name="Connecteur droit avec flèche 10">
+            <a:extLst>
+              <a:ext uri="{FF2B5EF4-FFF2-40B4-BE49-F238E27FC236}">
+                <a16:creationId xmlns:a16="http://schemas.microsoft.com/office/drawing/2014/main" id="{7C836F4B-8651-3CD4-0F9F-719239BA7E56}"/>
+              </a:ext>
+            </a:extLst>
+          </p:cNvPr>
+          <p:cNvCxnSpPr>
+            <a:cxnSpLocks/>
+            <a:stCxn id="8" idx="2"/>
+            <a:endCxn id="16" idx="1"/>
+          </p:cNvCxnSpPr>
+          <p:nvPr/>
+        </p:nvCxnSpPr>
+        <p:spPr>
+          <a:xfrm rot="16200000" flipH="1">
+            <a:off x="915062" y="1599795"/>
+            <a:ext cx="384000" cy="435883"/>
+          </a:xfrm>
+          <a:prstGeom prst="bentConnector2">
+            <a:avLst/>
+          </a:prstGeom>
+          <a:ln>
+            <a:solidFill>
+              <a:schemeClr val="tx1"/>
+            </a:solidFill>
+            <a:tailEnd type="triangle"/>
+          </a:ln>
+        </p:spPr>
+        <p:style>
+          <a:lnRef idx="1">
+            <a:schemeClr val="accent1"/>
+          </a:lnRef>
+          <a:fillRef idx="0">
+            <a:schemeClr val="accent1"/>
+          </a:fillRef>
+          <a:effectRef idx="0">
+            <a:schemeClr val="accent1"/>
+          </a:effectRef>
+          <a:fontRef idx="minor">
+            <a:schemeClr val="tx1"/>
+          </a:fontRef>
+        </p:style>
+      </p:cxnSp>
+      <p:cxnSp>
+        <p:nvCxnSpPr>
+          <p:cNvPr id="12" name="Connecteur droit avec flèche 11">
+            <a:extLst>
+              <a:ext uri="{FF2B5EF4-FFF2-40B4-BE49-F238E27FC236}">
+                <a16:creationId xmlns:a16="http://schemas.microsoft.com/office/drawing/2014/main" id="{46DF65E1-EDA9-52FE-9D4B-825834988348}"/>
+              </a:ext>
+            </a:extLst>
+          </p:cNvPr>
+          <p:cNvCxnSpPr>
+            <a:cxnSpLocks/>
+            <a:stCxn id="8" idx="2"/>
+            <a:endCxn id="17" idx="1"/>
+          </p:cNvCxnSpPr>
+          <p:nvPr/>
+        </p:nvCxnSpPr>
+        <p:spPr>
+          <a:xfrm rot="16200000" flipH="1">
+            <a:off x="731510" y="1783347"/>
+            <a:ext cx="751105" cy="435883"/>
+          </a:xfrm>
+          <a:prstGeom prst="bentConnector2">
+            <a:avLst/>
+          </a:prstGeom>
+          <a:ln>
+            <a:solidFill>
+              <a:schemeClr val="tx1"/>
+            </a:solidFill>
+            <a:tailEnd type="triangle"/>
+          </a:ln>
+        </p:spPr>
+        <p:style>
+          <a:lnRef idx="1">
+            <a:schemeClr val="accent1"/>
+          </a:lnRef>
+          <a:fillRef idx="0">
+            <a:schemeClr val="accent1"/>
+          </a:fillRef>
+          <a:effectRef idx="0">
+            <a:schemeClr val="accent1"/>
+          </a:effectRef>
+          <a:fontRef idx="minor">
+            <a:schemeClr val="tx1"/>
+          </a:fontRef>
+        </p:style>
+      </p:cxnSp>
+      <p:cxnSp>
+        <p:nvCxnSpPr>
+          <p:cNvPr id="13" name="Connecteur droit avec flèche 12">
+            <a:extLst>
+              <a:ext uri="{FF2B5EF4-FFF2-40B4-BE49-F238E27FC236}">
+                <a16:creationId xmlns:a16="http://schemas.microsoft.com/office/drawing/2014/main" id="{AF75AA71-45E7-B4B7-B0B2-E96276AFDC70}"/>
+              </a:ext>
+            </a:extLst>
+          </p:cNvPr>
+          <p:cNvCxnSpPr>
+            <a:cxnSpLocks/>
+            <a:stCxn id="8" idx="2"/>
+            <a:endCxn id="18" idx="1"/>
+          </p:cNvCxnSpPr>
+          <p:nvPr/>
+        </p:nvCxnSpPr>
+        <p:spPr>
+          <a:xfrm rot="16200000" flipH="1">
+            <a:off x="523305" y="1991552"/>
+            <a:ext cx="1167515" cy="435883"/>
+          </a:xfrm>
+          <a:prstGeom prst="bentConnector2">
+            <a:avLst/>
+          </a:prstGeom>
+          <a:ln>
+            <a:solidFill>
+              <a:schemeClr val="tx1"/>
+            </a:solidFill>
+            <a:tailEnd type="triangle"/>
+          </a:ln>
+        </p:spPr>
+        <p:style>
+          <a:lnRef idx="1">
+            <a:schemeClr val="accent1"/>
+          </a:lnRef>
+          <a:fillRef idx="0">
+            <a:schemeClr val="accent1"/>
+          </a:fillRef>
+          <a:effectRef idx="0">
+            <a:schemeClr val="accent1"/>
+          </a:effectRef>
+          <a:fontRef idx="minor">
+            <a:schemeClr val="tx1"/>
+          </a:fontRef>
+        </p:style>
+      </p:cxnSp>
+      <p:cxnSp>
+        <p:nvCxnSpPr>
+          <p:cNvPr id="14" name="Connecteur droit avec flèche 13">
+            <a:extLst>
+              <a:ext uri="{FF2B5EF4-FFF2-40B4-BE49-F238E27FC236}">
+                <a16:creationId xmlns:a16="http://schemas.microsoft.com/office/drawing/2014/main" id="{836AC499-B27D-E29F-5F48-7F704663EC80}"/>
+              </a:ext>
+            </a:extLst>
+          </p:cNvPr>
+          <p:cNvCxnSpPr>
+            <a:cxnSpLocks/>
+            <a:stCxn id="8" idx="2"/>
+            <a:endCxn id="19" idx="1"/>
+          </p:cNvCxnSpPr>
+          <p:nvPr/>
+        </p:nvCxnSpPr>
+        <p:spPr>
+          <a:xfrm rot="16200000" flipH="1">
+            <a:off x="339752" y="2175105"/>
+            <a:ext cx="1534620" cy="435883"/>
+          </a:xfrm>
+          <a:prstGeom prst="bentConnector2">
+            <a:avLst/>
+          </a:prstGeom>
+          <a:ln>
+            <a:solidFill>
+              <a:schemeClr val="tx1"/>
+            </a:solidFill>
+            <a:tailEnd type="triangle"/>
+          </a:ln>
+        </p:spPr>
+        <p:style>
+          <a:lnRef idx="1">
+            <a:schemeClr val="accent1"/>
+          </a:lnRef>
+          <a:fillRef idx="0">
+            <a:schemeClr val="accent1"/>
+          </a:fillRef>
+          <a:effectRef idx="0">
+            <a:schemeClr val="accent1"/>
+          </a:effectRef>
+          <a:fontRef idx="minor">
+            <a:schemeClr val="tx1"/>
+          </a:fontRef>
+        </p:style>
+      </p:cxnSp>
+      <p:cxnSp>
+        <p:nvCxnSpPr>
+          <p:cNvPr id="15" name="Connecteur droit avec flèche 14">
+            <a:extLst>
+              <a:ext uri="{FF2B5EF4-FFF2-40B4-BE49-F238E27FC236}">
+                <a16:creationId xmlns:a16="http://schemas.microsoft.com/office/drawing/2014/main" id="{7F2502D1-10AF-C628-4398-02DBA5F116CA}"/>
+              </a:ext>
+            </a:extLst>
+          </p:cNvPr>
+          <p:cNvCxnSpPr>
+            <a:stCxn id="8" idx="2"/>
+          </p:cNvCxnSpPr>
+          <p:nvPr/>
+        </p:nvCxnSpPr>
+        <p:spPr>
+          <a:xfrm rot="16200000" flipH="1">
+            <a:off x="113699" y="2401158"/>
+            <a:ext cx="1986727" cy="435883"/>
+          </a:xfrm>
+          <a:prstGeom prst="bentConnector3">
+            <a:avLst>
+              <a:gd name="adj1" fmla="val 99821"/>
+            </a:avLst>
+          </a:prstGeom>
+          <a:ln>
+            <a:solidFill>
+              <a:schemeClr val="tx1"/>
+            </a:solidFill>
+            <a:tailEnd type="triangle"/>
+          </a:ln>
+        </p:spPr>
+        <p:style>
+          <a:lnRef idx="1">
+            <a:schemeClr val="accent1"/>
+          </a:lnRef>
+          <a:fillRef idx="0">
+            <a:schemeClr val="accent1"/>
+          </a:fillRef>
+          <a:effectRef idx="0">
+            <a:schemeClr val="accent1"/>
+          </a:effectRef>
+          <a:fontRef idx="minor">
+            <a:schemeClr val="tx1"/>
+          </a:fontRef>
+        </p:style>
+      </p:cxnSp>
+      <p:sp>
+        <p:nvSpPr>
+          <p:cNvPr id="16" name="Rectangle à coins arrondis 15">
+            <a:extLst>
+              <a:ext uri="{FF2B5EF4-FFF2-40B4-BE49-F238E27FC236}">
+                <a16:creationId xmlns:a16="http://schemas.microsoft.com/office/drawing/2014/main" id="{65FD312A-A85A-D77F-54C7-954685B73A74}"/>
+              </a:ext>
+            </a:extLst>
+          </p:cNvPr>
+          <p:cNvSpPr/>
+          <p:nvPr/>
+        </p:nvSpPr>
+        <p:spPr>
+          <a:xfrm>
+            <a:off x="1325004" y="1855545"/>
+            <a:ext cx="1653052" cy="308384"/>
+          </a:xfrm>
+          <a:prstGeom prst="roundRect">
+            <a:avLst/>
+          </a:prstGeom>
+          <a:ln/>
+        </p:spPr>
+        <p:style>
+          <a:lnRef idx="1">
+            <a:schemeClr val="accent1"/>
+          </a:lnRef>
+          <a:fillRef idx="2">
+            <a:schemeClr val="accent1"/>
+          </a:fillRef>
+          <a:effectRef idx="1">
+            <a:schemeClr val="accent1"/>
+          </a:effectRef>
+          <a:fontRef idx="minor">
+            <a:schemeClr val="dk1"/>
+          </a:fontRef>
+        </p:style>
+        <p:txBody>
+          <a:bodyPr rtlCol="0" anchor="ctr"/>
+          <a:lstStyle/>
+          <a:p>
+            <a:pPr algn="ctr"/>
+            <a:r>
+              <a:rPr lang="fr-FR" sz="1200" dirty="0">
+                <a:solidFill>
+                  <a:schemeClr val="tx1"/>
+                </a:solidFill>
+              </a:rPr>
+              <a:t>bmi</a:t>
+            </a:r>
+          </a:p>
+        </p:txBody>
+      </p:sp>
+      <p:sp>
+        <p:nvSpPr>
+          <p:cNvPr id="17" name="Rectangle à coins arrondis 16">
+            <a:extLst>
+              <a:ext uri="{FF2B5EF4-FFF2-40B4-BE49-F238E27FC236}">
+                <a16:creationId xmlns:a16="http://schemas.microsoft.com/office/drawing/2014/main" id="{210E3F98-C444-1E4C-8658-9E1CB97546E5}"/>
+              </a:ext>
+            </a:extLst>
+          </p:cNvPr>
+          <p:cNvSpPr/>
+          <p:nvPr/>
+        </p:nvSpPr>
+        <p:spPr>
+          <a:xfrm>
+            <a:off x="1325004" y="2222650"/>
+            <a:ext cx="1653052" cy="308384"/>
+          </a:xfrm>
+          <a:prstGeom prst="roundRect">
+            <a:avLst/>
+          </a:prstGeom>
+          <a:ln/>
+        </p:spPr>
+        <p:style>
+          <a:lnRef idx="1">
+            <a:schemeClr val="accent1"/>
+          </a:lnRef>
+          <a:fillRef idx="2">
+            <a:schemeClr val="accent1"/>
+          </a:fillRef>
+          <a:effectRef idx="1">
+            <a:schemeClr val="accent1"/>
+          </a:effectRef>
+          <a:fontRef idx="minor">
+            <a:schemeClr val="dk1"/>
+          </a:fontRef>
+        </p:style>
+        <p:txBody>
+          <a:bodyPr rtlCol="0" anchor="ctr"/>
+          <a:lstStyle/>
+          <a:p>
+            <a:pPr algn="ctr"/>
+            <a:r>
+              <a:rPr lang="fr-FR" sz="1200" dirty="0">
+                <a:solidFill>
+                  <a:schemeClr val="tx1"/>
+                </a:solidFill>
+              </a:rPr>
+              <a:t>heartrate</a:t>
+            </a:r>
+          </a:p>
+        </p:txBody>
+      </p:sp>
+      <p:sp>
+        <p:nvSpPr>
+          <p:cNvPr id="18" name="Rectangle à coins arrondis 17">
+            <a:extLst>
+              <a:ext uri="{FF2B5EF4-FFF2-40B4-BE49-F238E27FC236}">
+                <a16:creationId xmlns:a16="http://schemas.microsoft.com/office/drawing/2014/main" id="{0E889915-E6BD-F0EC-0147-2A6480492179}"/>
+              </a:ext>
+            </a:extLst>
+          </p:cNvPr>
+          <p:cNvSpPr/>
+          <p:nvPr/>
+        </p:nvSpPr>
+        <p:spPr>
+          <a:xfrm>
+            <a:off x="1325004" y="2639060"/>
+            <a:ext cx="1653052" cy="308384"/>
+          </a:xfrm>
+          <a:prstGeom prst="roundRect">
+            <a:avLst/>
+          </a:prstGeom>
+          <a:ln/>
+        </p:spPr>
+        <p:style>
+          <a:lnRef idx="1">
+            <a:schemeClr val="accent1"/>
+          </a:lnRef>
+          <a:fillRef idx="2">
+            <a:schemeClr val="accent1"/>
+          </a:fillRef>
+          <a:effectRef idx="1">
+            <a:schemeClr val="accent1"/>
+          </a:effectRef>
+          <a:fontRef idx="minor">
+            <a:schemeClr val="dk1"/>
+          </a:fontRef>
+        </p:style>
+        <p:txBody>
+          <a:bodyPr rtlCol="0" anchor="ctr"/>
+          <a:lstStyle/>
+          <a:p>
+            <a:pPr algn="ctr"/>
+            <a:r>
+              <a:rPr lang="fr-FR" sz="1200" dirty="0">
+                <a:solidFill>
+                  <a:schemeClr val="tx1"/>
+                </a:solidFill>
+              </a:rPr>
+              <a:t>bodyweight</a:t>
+            </a:r>
+          </a:p>
+        </p:txBody>
+      </p:sp>
+      <p:sp>
+        <p:nvSpPr>
+          <p:cNvPr id="19" name="Rectangle à coins arrondis 18">
+            <a:extLst>
+              <a:ext uri="{FF2B5EF4-FFF2-40B4-BE49-F238E27FC236}">
+                <a16:creationId xmlns:a16="http://schemas.microsoft.com/office/drawing/2014/main" id="{191884C7-1C61-E022-D4B6-29F341F9B116}"/>
+              </a:ext>
+            </a:extLst>
+          </p:cNvPr>
+          <p:cNvSpPr/>
+          <p:nvPr/>
+        </p:nvSpPr>
+        <p:spPr>
+          <a:xfrm>
+            <a:off x="1325004" y="3006165"/>
+            <a:ext cx="1653052" cy="308384"/>
+          </a:xfrm>
+          <a:prstGeom prst="roundRect">
+            <a:avLst/>
+          </a:prstGeom>
+          <a:ln/>
+        </p:spPr>
+        <p:style>
+          <a:lnRef idx="1">
+            <a:schemeClr val="accent1"/>
+          </a:lnRef>
+          <a:fillRef idx="2">
+            <a:schemeClr val="accent1"/>
+          </a:fillRef>
+          <a:effectRef idx="1">
+            <a:schemeClr val="accent1"/>
+          </a:effectRef>
+          <a:fontRef idx="minor">
+            <a:schemeClr val="dk1"/>
+          </a:fontRef>
+        </p:style>
+        <p:txBody>
+          <a:bodyPr rtlCol="0" anchor="ctr"/>
+          <a:lstStyle/>
+          <a:p>
+            <a:pPr algn="ctr"/>
+            <a:r>
+              <a:rPr lang="fr-FR" sz="1200" dirty="0">
+                <a:solidFill>
+                  <a:schemeClr val="tx1"/>
+                </a:solidFill>
+              </a:rPr>
+              <a:t>bodyheight</a:t>
+            </a:r>
+          </a:p>
+        </p:txBody>
+      </p:sp>
+      <p:sp>
+        <p:nvSpPr>
+          <p:cNvPr id="20" name="Rectangle à coins arrondis 19">
+            <a:extLst>
+              <a:ext uri="{FF2B5EF4-FFF2-40B4-BE49-F238E27FC236}">
+                <a16:creationId xmlns:a16="http://schemas.microsoft.com/office/drawing/2014/main" id="{3164807E-4245-36CE-DBDC-CA43740888D1}"/>
+              </a:ext>
+            </a:extLst>
+          </p:cNvPr>
+          <p:cNvSpPr/>
+          <p:nvPr/>
+        </p:nvSpPr>
+        <p:spPr>
+          <a:xfrm>
+            <a:off x="1325004" y="3403748"/>
+            <a:ext cx="1653052" cy="308384"/>
+          </a:xfrm>
+          <a:prstGeom prst="roundRect">
+            <a:avLst/>
+          </a:prstGeom>
+          <a:ln/>
+        </p:spPr>
+        <p:style>
+          <a:lnRef idx="1">
+            <a:schemeClr val="accent1"/>
+          </a:lnRef>
+          <a:fillRef idx="2">
+            <a:schemeClr val="accent1"/>
+          </a:fillRef>
+          <a:effectRef idx="1">
+            <a:schemeClr val="accent1"/>
+          </a:effectRef>
+          <a:fontRef idx="minor">
+            <a:schemeClr val="dk1"/>
+          </a:fontRef>
+        </p:style>
+        <p:txBody>
+          <a:bodyPr rtlCol="0" anchor="ctr"/>
+          <a:lstStyle/>
+          <a:p>
+            <a:pPr algn="ctr"/>
+            <a:r>
+              <a:rPr lang="fr-FR" sz="1200" dirty="0">
+                <a:solidFill>
+                  <a:schemeClr val="tx1"/>
+                </a:solidFill>
+              </a:rPr>
+              <a:t>bodytemperature</a:t>
+            </a:r>
+          </a:p>
+        </p:txBody>
+      </p:sp>
+      <p:cxnSp>
+        <p:nvCxnSpPr>
+          <p:cNvPr id="21" name="Connecteur droit avec flèche 20">
+            <a:extLst>
+              <a:ext uri="{FF2B5EF4-FFF2-40B4-BE49-F238E27FC236}">
+                <a16:creationId xmlns:a16="http://schemas.microsoft.com/office/drawing/2014/main" id="{463A7945-6C76-A968-566F-6E494F701A5C}"/>
+              </a:ext>
+            </a:extLst>
+          </p:cNvPr>
+          <p:cNvCxnSpPr/>
+          <p:nvPr/>
+        </p:nvCxnSpPr>
+        <p:spPr>
+          <a:xfrm>
+            <a:off x="2974508" y="2007016"/>
+            <a:ext cx="519953" cy="0"/>
+          </a:xfrm>
+          <a:prstGeom prst="straightConnector1">
+            <a:avLst/>
+          </a:prstGeom>
+          <a:ln>
+            <a:solidFill>
+              <a:schemeClr val="tx1"/>
+            </a:solidFill>
+            <a:tailEnd type="triangle"/>
+          </a:ln>
+        </p:spPr>
+        <p:style>
+          <a:lnRef idx="1">
+            <a:schemeClr val="accent1"/>
+          </a:lnRef>
+          <a:fillRef idx="0">
+            <a:schemeClr val="accent1"/>
+          </a:fillRef>
+          <a:effectRef idx="0">
+            <a:schemeClr val="accent1"/>
+          </a:effectRef>
+          <a:fontRef idx="minor">
+            <a:schemeClr val="tx1"/>
+          </a:fontRef>
+        </p:style>
+      </p:cxnSp>
+      <p:cxnSp>
+        <p:nvCxnSpPr>
+          <p:cNvPr id="22" name="Connecteur droit avec flèche 21">
+            <a:extLst>
+              <a:ext uri="{FF2B5EF4-FFF2-40B4-BE49-F238E27FC236}">
+                <a16:creationId xmlns:a16="http://schemas.microsoft.com/office/drawing/2014/main" id="{8F63C790-270F-23F0-8E39-0F5BAF1092BE}"/>
+              </a:ext>
+            </a:extLst>
+          </p:cNvPr>
+          <p:cNvCxnSpPr/>
+          <p:nvPr/>
+        </p:nvCxnSpPr>
+        <p:spPr>
+          <a:xfrm>
+            <a:off x="2974508" y="2390705"/>
+            <a:ext cx="519953" cy="0"/>
+          </a:xfrm>
+          <a:prstGeom prst="straightConnector1">
+            <a:avLst/>
+          </a:prstGeom>
+          <a:ln>
+            <a:solidFill>
+              <a:schemeClr val="tx1"/>
+            </a:solidFill>
+            <a:tailEnd type="triangle"/>
+          </a:ln>
+        </p:spPr>
+        <p:style>
+          <a:lnRef idx="1">
+            <a:schemeClr val="accent1"/>
+          </a:lnRef>
+          <a:fillRef idx="0">
+            <a:schemeClr val="accent1"/>
+          </a:fillRef>
+          <a:effectRef idx="0">
+            <a:schemeClr val="accent1"/>
+          </a:effectRef>
+          <a:fontRef idx="minor">
+            <a:schemeClr val="tx1"/>
+          </a:fontRef>
+        </p:style>
+      </p:cxnSp>
+      <p:cxnSp>
+        <p:nvCxnSpPr>
+          <p:cNvPr id="23" name="Connecteur droit avec flèche 22">
+            <a:extLst>
+              <a:ext uri="{FF2B5EF4-FFF2-40B4-BE49-F238E27FC236}">
+                <a16:creationId xmlns:a16="http://schemas.microsoft.com/office/drawing/2014/main" id="{FDBF3EEF-AEB4-954A-3E32-08F123E64F68}"/>
+              </a:ext>
+            </a:extLst>
+          </p:cNvPr>
+          <p:cNvCxnSpPr/>
+          <p:nvPr/>
+        </p:nvCxnSpPr>
+        <p:spPr>
+          <a:xfrm>
+            <a:off x="2974508" y="2774394"/>
+            <a:ext cx="519953" cy="0"/>
+          </a:xfrm>
+          <a:prstGeom prst="straightConnector1">
+            <a:avLst/>
+          </a:prstGeom>
+          <a:ln>
+            <a:solidFill>
+              <a:schemeClr val="tx1"/>
+            </a:solidFill>
+            <a:tailEnd type="triangle"/>
+          </a:ln>
+        </p:spPr>
+        <p:style>
+          <a:lnRef idx="1">
+            <a:schemeClr val="accent1"/>
+          </a:lnRef>
+          <a:fillRef idx="0">
+            <a:schemeClr val="accent1"/>
+          </a:fillRef>
+          <a:effectRef idx="0">
+            <a:schemeClr val="accent1"/>
+          </a:effectRef>
+          <a:fontRef idx="minor">
+            <a:schemeClr val="tx1"/>
+          </a:fontRef>
+        </p:style>
+      </p:cxnSp>
+      <p:cxnSp>
+        <p:nvCxnSpPr>
+          <p:cNvPr id="24" name="Connecteur droit avec flèche 23">
+            <a:extLst>
+              <a:ext uri="{FF2B5EF4-FFF2-40B4-BE49-F238E27FC236}">
+                <a16:creationId xmlns:a16="http://schemas.microsoft.com/office/drawing/2014/main" id="{63E1D7D4-6ED0-705A-7C0F-A0FEDC86D83E}"/>
+              </a:ext>
+            </a:extLst>
+          </p:cNvPr>
+          <p:cNvCxnSpPr/>
+          <p:nvPr/>
+        </p:nvCxnSpPr>
+        <p:spPr>
+          <a:xfrm>
+            <a:off x="2974508" y="3158083"/>
+            <a:ext cx="519953" cy="0"/>
+          </a:xfrm>
+          <a:prstGeom prst="straightConnector1">
+            <a:avLst/>
+          </a:prstGeom>
+          <a:ln>
+            <a:solidFill>
+              <a:schemeClr val="tx1"/>
+            </a:solidFill>
+            <a:tailEnd type="triangle"/>
+          </a:ln>
+        </p:spPr>
+        <p:style>
+          <a:lnRef idx="1">
+            <a:schemeClr val="accent1"/>
+          </a:lnRef>
+          <a:fillRef idx="0">
+            <a:schemeClr val="accent1"/>
+          </a:fillRef>
+          <a:effectRef idx="0">
+            <a:schemeClr val="accent1"/>
+          </a:effectRef>
+          <a:fontRef idx="minor">
+            <a:schemeClr val="tx1"/>
+          </a:fontRef>
+        </p:style>
+      </p:cxnSp>
+      <p:cxnSp>
+        <p:nvCxnSpPr>
+          <p:cNvPr id="25" name="Connecteur droit avec flèche 24">
+            <a:extLst>
+              <a:ext uri="{FF2B5EF4-FFF2-40B4-BE49-F238E27FC236}">
+                <a16:creationId xmlns:a16="http://schemas.microsoft.com/office/drawing/2014/main" id="{52E90E3D-1DF3-F12E-86D3-618CDAB516BC}"/>
+              </a:ext>
+            </a:extLst>
+          </p:cNvPr>
+          <p:cNvCxnSpPr/>
+          <p:nvPr/>
+        </p:nvCxnSpPr>
+        <p:spPr>
+          <a:xfrm>
+            <a:off x="2974508" y="3541772"/>
+            <a:ext cx="519953" cy="0"/>
+          </a:xfrm>
+          <a:prstGeom prst="straightConnector1">
+            <a:avLst/>
+          </a:prstGeom>
+          <a:ln>
+            <a:solidFill>
+              <a:schemeClr val="tx1"/>
+            </a:solidFill>
+            <a:tailEnd type="triangle"/>
+          </a:ln>
+        </p:spPr>
+        <p:style>
+          <a:lnRef idx="1">
+            <a:schemeClr val="accent1"/>
+          </a:lnRef>
+          <a:fillRef idx="0">
+            <a:schemeClr val="accent1"/>
+          </a:fillRef>
+          <a:effectRef idx="0">
+            <a:schemeClr val="accent1"/>
+          </a:effectRef>
+          <a:fontRef idx="minor">
+            <a:schemeClr val="tx1"/>
+          </a:fontRef>
+        </p:style>
+      </p:cxnSp>
+      <p:sp>
+        <p:nvSpPr>
+          <p:cNvPr id="26" name="Rectangle à coins arrondis 25">
+            <a:extLst>
+              <a:ext uri="{FF2B5EF4-FFF2-40B4-BE49-F238E27FC236}">
+                <a16:creationId xmlns:a16="http://schemas.microsoft.com/office/drawing/2014/main" id="{0EC50287-84E1-B5DB-FF70-695D74765BF2}"/>
+              </a:ext>
+            </a:extLst>
+          </p:cNvPr>
+          <p:cNvSpPr/>
+          <p:nvPr/>
+        </p:nvSpPr>
+        <p:spPr>
+          <a:xfrm>
+            <a:off x="3494461" y="1844824"/>
+            <a:ext cx="2225935" cy="281940"/>
+          </a:xfrm>
+          <a:prstGeom prst="roundRect">
+            <a:avLst/>
+          </a:prstGeom>
+          <a:ln/>
+        </p:spPr>
+        <p:style>
+          <a:lnRef idx="1">
+            <a:schemeClr val="accent4"/>
+          </a:lnRef>
+          <a:fillRef idx="2">
+            <a:schemeClr val="accent4"/>
+          </a:fillRef>
+          <a:effectRef idx="1">
+            <a:schemeClr val="accent4"/>
+          </a:effectRef>
+          <a:fontRef idx="minor">
+            <a:schemeClr val="dk1"/>
+          </a:fontRef>
+        </p:style>
+        <p:txBody>
+          <a:bodyPr rtlCol="0" anchor="ctr"/>
+          <a:lstStyle/>
+          <a:p>
+            <a:pPr algn="ctr"/>
+            <a:r>
+              <a:rPr lang="fr-FR" sz="1200" dirty="0">
+                <a:solidFill>
+                  <a:schemeClr val="tx1"/>
+                </a:solidFill>
+              </a:rPr>
+              <a:t>FrObservationBmi</a:t>
+            </a:r>
+          </a:p>
+        </p:txBody>
+      </p:sp>
+      <p:sp>
+        <p:nvSpPr>
+          <p:cNvPr id="27" name="Rectangle à coins arrondis 26">
+            <a:extLst>
+              <a:ext uri="{FF2B5EF4-FFF2-40B4-BE49-F238E27FC236}">
+                <a16:creationId xmlns:a16="http://schemas.microsoft.com/office/drawing/2014/main" id="{30D7D424-19FB-B4D1-D839-AA4580839BD0}"/>
+              </a:ext>
+            </a:extLst>
+          </p:cNvPr>
+          <p:cNvSpPr/>
+          <p:nvPr/>
+        </p:nvSpPr>
+        <p:spPr>
+          <a:xfrm>
+            <a:off x="3494461" y="2211929"/>
+            <a:ext cx="2225935" cy="315108"/>
+          </a:xfrm>
+          <a:prstGeom prst="roundRect">
+            <a:avLst/>
+          </a:prstGeom>
+          <a:ln/>
+        </p:spPr>
+        <p:style>
+          <a:lnRef idx="1">
+            <a:schemeClr val="accent4"/>
+          </a:lnRef>
+          <a:fillRef idx="2">
+            <a:schemeClr val="accent4"/>
+          </a:fillRef>
+          <a:effectRef idx="1">
+            <a:schemeClr val="accent4"/>
+          </a:effectRef>
+          <a:fontRef idx="minor">
+            <a:schemeClr val="dk1"/>
+          </a:fontRef>
+        </p:style>
+        <p:txBody>
+          <a:bodyPr rtlCol="0" anchor="ctr"/>
+          <a:lstStyle/>
+          <a:p>
+            <a:pPr algn="ctr"/>
+            <a:r>
+              <a:rPr lang="fr-FR" sz="1200" dirty="0">
+                <a:solidFill>
+                  <a:schemeClr val="tx1"/>
+                </a:solidFill>
+              </a:rPr>
+              <a:t>FrObservationHeartrate</a:t>
+            </a:r>
+          </a:p>
+        </p:txBody>
+      </p:sp>
+      <p:sp>
+        <p:nvSpPr>
+          <p:cNvPr id="28" name="Rectangle à coins arrondis 27">
+            <a:extLst>
+              <a:ext uri="{FF2B5EF4-FFF2-40B4-BE49-F238E27FC236}">
+                <a16:creationId xmlns:a16="http://schemas.microsoft.com/office/drawing/2014/main" id="{51808A21-CC8F-6138-E29B-5F7FD8BFFA15}"/>
+              </a:ext>
+            </a:extLst>
+          </p:cNvPr>
+          <p:cNvSpPr/>
+          <p:nvPr/>
+        </p:nvSpPr>
+        <p:spPr>
+          <a:xfrm>
+            <a:off x="3494461" y="2628339"/>
+            <a:ext cx="2225935" cy="315108"/>
+          </a:xfrm>
+          <a:prstGeom prst="roundRect">
+            <a:avLst/>
+          </a:prstGeom>
+          <a:ln/>
+        </p:spPr>
+        <p:style>
+          <a:lnRef idx="1">
+            <a:schemeClr val="accent4"/>
+          </a:lnRef>
+          <a:fillRef idx="2">
+            <a:schemeClr val="accent4"/>
+          </a:fillRef>
+          <a:effectRef idx="1">
+            <a:schemeClr val="accent4"/>
+          </a:effectRef>
+          <a:fontRef idx="minor">
+            <a:schemeClr val="dk1"/>
+          </a:fontRef>
+        </p:style>
+        <p:txBody>
+          <a:bodyPr rtlCol="0" anchor="ctr"/>
+          <a:lstStyle/>
+          <a:p>
+            <a:pPr algn="ctr"/>
+            <a:r>
+              <a:rPr lang="fr-FR" sz="1200" dirty="0">
+                <a:solidFill>
+                  <a:schemeClr val="tx1"/>
+                </a:solidFill>
+              </a:rPr>
+              <a:t>FrObservationBodyWeight</a:t>
+            </a:r>
+          </a:p>
+        </p:txBody>
+      </p:sp>
+      <p:sp>
+        <p:nvSpPr>
+          <p:cNvPr id="29" name="Rectangle à coins arrondis 28">
+            <a:extLst>
+              <a:ext uri="{FF2B5EF4-FFF2-40B4-BE49-F238E27FC236}">
+                <a16:creationId xmlns:a16="http://schemas.microsoft.com/office/drawing/2014/main" id="{A2E08E15-EEED-4721-E024-56681D9C74CA}"/>
+              </a:ext>
+            </a:extLst>
+          </p:cNvPr>
+          <p:cNvSpPr/>
+          <p:nvPr/>
+        </p:nvSpPr>
+        <p:spPr>
+          <a:xfrm>
+            <a:off x="3494461" y="2995444"/>
+            <a:ext cx="2225935" cy="315108"/>
+          </a:xfrm>
+          <a:prstGeom prst="roundRect">
+            <a:avLst/>
+          </a:prstGeom>
+          <a:ln/>
+        </p:spPr>
+        <p:style>
+          <a:lnRef idx="1">
+            <a:schemeClr val="accent4"/>
+          </a:lnRef>
+          <a:fillRef idx="2">
+            <a:schemeClr val="accent4"/>
+          </a:fillRef>
+          <a:effectRef idx="1">
+            <a:schemeClr val="accent4"/>
+          </a:effectRef>
+          <a:fontRef idx="minor">
+            <a:schemeClr val="dk1"/>
+          </a:fontRef>
+        </p:style>
+        <p:txBody>
+          <a:bodyPr rtlCol="0" anchor="ctr"/>
+          <a:lstStyle/>
+          <a:p>
+            <a:pPr algn="ctr"/>
+            <a:r>
+              <a:rPr lang="fr-FR" sz="1200" dirty="0">
+                <a:solidFill>
+                  <a:schemeClr val="tx1"/>
+                </a:solidFill>
+              </a:rPr>
+              <a:t>FrObservationBodyHeight</a:t>
+            </a:r>
+          </a:p>
+        </p:txBody>
+      </p:sp>
+      <p:sp>
+        <p:nvSpPr>
+          <p:cNvPr id="30" name="Rectangle à coins arrondis 29">
+            <a:extLst>
+              <a:ext uri="{FF2B5EF4-FFF2-40B4-BE49-F238E27FC236}">
+                <a16:creationId xmlns:a16="http://schemas.microsoft.com/office/drawing/2014/main" id="{43B974EF-1576-2189-9D43-94D3AFC374E1}"/>
+              </a:ext>
+            </a:extLst>
+          </p:cNvPr>
+          <p:cNvSpPr/>
+          <p:nvPr/>
+        </p:nvSpPr>
+        <p:spPr>
+          <a:xfrm>
+            <a:off x="3494461" y="3393027"/>
+            <a:ext cx="2225935" cy="315108"/>
+          </a:xfrm>
+          <a:prstGeom prst="roundRect">
+            <a:avLst/>
+          </a:prstGeom>
+          <a:ln/>
+        </p:spPr>
+        <p:style>
+          <a:lnRef idx="1">
+            <a:schemeClr val="accent4"/>
+          </a:lnRef>
+          <a:fillRef idx="2">
+            <a:schemeClr val="accent4"/>
+          </a:fillRef>
+          <a:effectRef idx="1">
+            <a:schemeClr val="accent4"/>
+          </a:effectRef>
+          <a:fontRef idx="minor">
+            <a:schemeClr val="dk1"/>
+          </a:fontRef>
+        </p:style>
+        <p:txBody>
+          <a:bodyPr rtlCol="0" anchor="ctr"/>
+          <a:lstStyle/>
+          <a:p>
+            <a:pPr algn="ctr"/>
+            <a:r>
+              <a:rPr lang="fr-FR" sz="1200" dirty="0">
+                <a:solidFill>
+                  <a:schemeClr val="tx1"/>
+                </a:solidFill>
+              </a:rPr>
+              <a:t>FrObservationBodyTemperature</a:t>
+            </a:r>
+          </a:p>
+        </p:txBody>
+      </p:sp>
+      <p:cxnSp>
+        <p:nvCxnSpPr>
+          <p:cNvPr id="33" name="Connecteur droit avec flèche 32">
+            <a:extLst>
+              <a:ext uri="{FF2B5EF4-FFF2-40B4-BE49-F238E27FC236}">
+                <a16:creationId xmlns:a16="http://schemas.microsoft.com/office/drawing/2014/main" id="{9734FFC6-6FD2-8368-3FE1-36562A5E3B4B}"/>
+              </a:ext>
+            </a:extLst>
+          </p:cNvPr>
+          <p:cNvCxnSpPr/>
+          <p:nvPr/>
+        </p:nvCxnSpPr>
+        <p:spPr>
+          <a:xfrm>
+            <a:off x="5708048" y="1993217"/>
+            <a:ext cx="519953" cy="0"/>
+          </a:xfrm>
+          <a:prstGeom prst="straightConnector1">
+            <a:avLst/>
+          </a:prstGeom>
+          <a:ln>
+            <a:solidFill>
+              <a:schemeClr val="tx1"/>
+            </a:solidFill>
+            <a:tailEnd type="triangle"/>
+          </a:ln>
+        </p:spPr>
+        <p:style>
+          <a:lnRef idx="1">
+            <a:schemeClr val="accent1"/>
+          </a:lnRef>
+          <a:fillRef idx="0">
+            <a:schemeClr val="accent1"/>
+          </a:fillRef>
+          <a:effectRef idx="0">
+            <a:schemeClr val="accent1"/>
+          </a:effectRef>
+          <a:fontRef idx="minor">
+            <a:schemeClr val="tx1"/>
+          </a:fontRef>
+        </p:style>
+      </p:cxnSp>
+      <p:cxnSp>
+        <p:nvCxnSpPr>
+          <p:cNvPr id="34" name="Connecteur droit avec flèche 33">
+            <a:extLst>
+              <a:ext uri="{FF2B5EF4-FFF2-40B4-BE49-F238E27FC236}">
+                <a16:creationId xmlns:a16="http://schemas.microsoft.com/office/drawing/2014/main" id="{3E5F5EDE-B48F-0F78-44B8-1607F1F389A4}"/>
+              </a:ext>
+            </a:extLst>
+          </p:cNvPr>
+          <p:cNvCxnSpPr/>
+          <p:nvPr/>
+        </p:nvCxnSpPr>
+        <p:spPr>
+          <a:xfrm>
+            <a:off x="5708048" y="2376906"/>
+            <a:ext cx="519953" cy="0"/>
+          </a:xfrm>
+          <a:prstGeom prst="straightConnector1">
+            <a:avLst/>
+          </a:prstGeom>
+          <a:ln>
+            <a:solidFill>
+              <a:schemeClr val="tx1"/>
+            </a:solidFill>
+            <a:tailEnd type="triangle"/>
+          </a:ln>
+        </p:spPr>
+        <p:style>
+          <a:lnRef idx="1">
+            <a:schemeClr val="accent1"/>
+          </a:lnRef>
+          <a:fillRef idx="0">
+            <a:schemeClr val="accent1"/>
+          </a:fillRef>
+          <a:effectRef idx="0">
+            <a:schemeClr val="accent1"/>
+          </a:effectRef>
+          <a:fontRef idx="minor">
+            <a:schemeClr val="tx1"/>
+          </a:fontRef>
+        </p:style>
+      </p:cxnSp>
+      <p:cxnSp>
+        <p:nvCxnSpPr>
+          <p:cNvPr id="35" name="Connecteur droit avec flèche 34">
+            <a:extLst>
+              <a:ext uri="{FF2B5EF4-FFF2-40B4-BE49-F238E27FC236}">
+                <a16:creationId xmlns:a16="http://schemas.microsoft.com/office/drawing/2014/main" id="{D4078F76-F0A1-FAD8-351F-F7384A3C757F}"/>
+              </a:ext>
+            </a:extLst>
+          </p:cNvPr>
+          <p:cNvCxnSpPr/>
+          <p:nvPr/>
+        </p:nvCxnSpPr>
+        <p:spPr>
+          <a:xfrm>
+            <a:off x="5708048" y="2760595"/>
+            <a:ext cx="519953" cy="0"/>
+          </a:xfrm>
+          <a:prstGeom prst="straightConnector1">
+            <a:avLst/>
+          </a:prstGeom>
+          <a:ln>
+            <a:solidFill>
+              <a:schemeClr val="tx1"/>
+            </a:solidFill>
+            <a:tailEnd type="triangle"/>
+          </a:ln>
+        </p:spPr>
+        <p:style>
+          <a:lnRef idx="1">
+            <a:schemeClr val="accent1"/>
+          </a:lnRef>
+          <a:fillRef idx="0">
+            <a:schemeClr val="accent1"/>
+          </a:fillRef>
+          <a:effectRef idx="0">
+            <a:schemeClr val="accent1"/>
+          </a:effectRef>
+          <a:fontRef idx="minor">
+            <a:schemeClr val="tx1"/>
+          </a:fontRef>
+        </p:style>
+      </p:cxnSp>
+      <p:cxnSp>
+        <p:nvCxnSpPr>
+          <p:cNvPr id="36" name="Connecteur droit avec flèche 35">
+            <a:extLst>
+              <a:ext uri="{FF2B5EF4-FFF2-40B4-BE49-F238E27FC236}">
+                <a16:creationId xmlns:a16="http://schemas.microsoft.com/office/drawing/2014/main" id="{63A07AE2-8221-A77A-1157-D2EEBE9B9FD0}"/>
+              </a:ext>
+            </a:extLst>
+          </p:cNvPr>
+          <p:cNvCxnSpPr/>
+          <p:nvPr/>
+        </p:nvCxnSpPr>
+        <p:spPr>
+          <a:xfrm>
+            <a:off x="5708048" y="3144284"/>
+            <a:ext cx="519953" cy="0"/>
+          </a:xfrm>
+          <a:prstGeom prst="straightConnector1">
+            <a:avLst/>
+          </a:prstGeom>
+          <a:ln>
+            <a:solidFill>
+              <a:schemeClr val="tx1"/>
+            </a:solidFill>
+            <a:tailEnd type="triangle"/>
+          </a:ln>
+        </p:spPr>
+        <p:style>
+          <a:lnRef idx="1">
+            <a:schemeClr val="accent1"/>
+          </a:lnRef>
+          <a:fillRef idx="0">
+            <a:schemeClr val="accent1"/>
+          </a:fillRef>
+          <a:effectRef idx="0">
+            <a:schemeClr val="accent1"/>
+          </a:effectRef>
+          <a:fontRef idx="minor">
+            <a:schemeClr val="tx1"/>
+          </a:fontRef>
+        </p:style>
+      </p:cxnSp>
+      <p:cxnSp>
+        <p:nvCxnSpPr>
+          <p:cNvPr id="37" name="Connecteur droit avec flèche 36">
+            <a:extLst>
+              <a:ext uri="{FF2B5EF4-FFF2-40B4-BE49-F238E27FC236}">
+                <a16:creationId xmlns:a16="http://schemas.microsoft.com/office/drawing/2014/main" id="{49B560B4-0153-6CB3-7B0F-767AD4C45810}"/>
+              </a:ext>
+            </a:extLst>
+          </p:cNvPr>
+          <p:cNvCxnSpPr/>
+          <p:nvPr/>
+        </p:nvCxnSpPr>
+        <p:spPr>
+          <a:xfrm>
+            <a:off x="5708048" y="3527973"/>
+            <a:ext cx="519953" cy="0"/>
+          </a:xfrm>
+          <a:prstGeom prst="straightConnector1">
+            <a:avLst/>
+          </a:prstGeom>
+          <a:ln>
+            <a:solidFill>
+              <a:schemeClr val="tx1"/>
+            </a:solidFill>
+            <a:tailEnd type="triangle"/>
+          </a:ln>
+        </p:spPr>
+        <p:style>
+          <a:lnRef idx="1">
+            <a:schemeClr val="accent1"/>
+          </a:lnRef>
+          <a:fillRef idx="0">
+            <a:schemeClr val="accent1"/>
+          </a:fillRef>
+          <a:effectRef idx="0">
+            <a:schemeClr val="accent1"/>
+          </a:effectRef>
+          <a:fontRef idx="minor">
+            <a:schemeClr val="tx1"/>
+          </a:fontRef>
+        </p:style>
+      </p:cxnSp>
+      <p:sp>
+        <p:nvSpPr>
+          <p:cNvPr id="38" name="Rectangle à coins arrondis 37">
+            <a:extLst>
+              <a:ext uri="{FF2B5EF4-FFF2-40B4-BE49-F238E27FC236}">
+                <a16:creationId xmlns:a16="http://schemas.microsoft.com/office/drawing/2014/main" id="{3DC566FF-E66A-A946-89A6-E8268ED03914}"/>
+              </a:ext>
+            </a:extLst>
+          </p:cNvPr>
+          <p:cNvSpPr/>
+          <p:nvPr/>
+        </p:nvSpPr>
+        <p:spPr>
+          <a:xfrm>
+            <a:off x="6224452" y="1866590"/>
+            <a:ext cx="2689413" cy="280800"/>
+          </a:xfrm>
+          <a:prstGeom prst="roundRect">
+            <a:avLst/>
+          </a:prstGeom>
+          <a:ln/>
+        </p:spPr>
+        <p:style>
+          <a:lnRef idx="1">
+            <a:schemeClr val="accent6"/>
+          </a:lnRef>
+          <a:fillRef idx="2">
+            <a:schemeClr val="accent6"/>
+          </a:fillRef>
+          <a:effectRef idx="1">
+            <a:schemeClr val="accent6"/>
+          </a:effectRef>
+          <a:fontRef idx="minor">
+            <a:schemeClr val="dk1"/>
+          </a:fontRef>
+        </p:style>
+        <p:txBody>
+          <a:bodyPr rtlCol="0" anchor="ctr"/>
+          <a:lstStyle/>
+          <a:p>
+            <a:pPr algn="ctr"/>
+            <a:r>
+              <a:rPr lang="fr-FR" sz="1000" dirty="0">
+                <a:solidFill>
+                  <a:schemeClr val="tx1"/>
+                </a:solidFill>
+              </a:rPr>
+              <a:t>MesFrObservationBmi</a:t>
+            </a:r>
+          </a:p>
+        </p:txBody>
+      </p:sp>
+      <p:sp>
+        <p:nvSpPr>
+          <p:cNvPr id="39" name="Rectangle à coins arrondis 38">
+            <a:extLst>
+              <a:ext uri="{FF2B5EF4-FFF2-40B4-BE49-F238E27FC236}">
+                <a16:creationId xmlns:a16="http://schemas.microsoft.com/office/drawing/2014/main" id="{DA04F85C-1A32-0D50-9E68-ACC70841C025}"/>
+              </a:ext>
+            </a:extLst>
+          </p:cNvPr>
+          <p:cNvSpPr/>
+          <p:nvPr/>
+        </p:nvSpPr>
+        <p:spPr>
+          <a:xfrm>
+            <a:off x="6224452" y="2250279"/>
+            <a:ext cx="2689413" cy="280800"/>
+          </a:xfrm>
+          <a:prstGeom prst="roundRect">
+            <a:avLst/>
+          </a:prstGeom>
+          <a:ln/>
+        </p:spPr>
+        <p:style>
+          <a:lnRef idx="1">
+            <a:schemeClr val="accent6"/>
+          </a:lnRef>
+          <a:fillRef idx="2">
+            <a:schemeClr val="accent6"/>
+          </a:fillRef>
+          <a:effectRef idx="1">
+            <a:schemeClr val="accent6"/>
+          </a:effectRef>
+          <a:fontRef idx="minor">
+            <a:schemeClr val="dk1"/>
+          </a:fontRef>
+        </p:style>
+        <p:txBody>
+          <a:bodyPr rtlCol="0" anchor="ctr"/>
+          <a:lstStyle/>
+          <a:p>
+            <a:pPr algn="ctr"/>
+            <a:r>
+              <a:rPr lang="fr-FR" sz="1000" dirty="0">
+                <a:solidFill>
+                  <a:schemeClr val="tx1"/>
+                </a:solidFill>
+              </a:rPr>
+              <a:t>MesFrObservationHeartrate</a:t>
+            </a:r>
+          </a:p>
+        </p:txBody>
+      </p:sp>
+      <p:sp>
+        <p:nvSpPr>
+          <p:cNvPr id="40" name="Rectangle à coins arrondis 39">
+            <a:extLst>
+              <a:ext uri="{FF2B5EF4-FFF2-40B4-BE49-F238E27FC236}">
+                <a16:creationId xmlns:a16="http://schemas.microsoft.com/office/drawing/2014/main" id="{96AF7E18-14D2-59B5-0281-93F2A90B46BF}"/>
+              </a:ext>
+            </a:extLst>
+          </p:cNvPr>
+          <p:cNvSpPr/>
+          <p:nvPr/>
+        </p:nvSpPr>
+        <p:spPr>
+          <a:xfrm>
+            <a:off x="6224452" y="2633968"/>
+            <a:ext cx="2689413" cy="280800"/>
+          </a:xfrm>
+          <a:prstGeom prst="roundRect">
+            <a:avLst/>
+          </a:prstGeom>
+          <a:ln/>
+        </p:spPr>
+        <p:style>
+          <a:lnRef idx="1">
+            <a:schemeClr val="accent6"/>
+          </a:lnRef>
+          <a:fillRef idx="2">
+            <a:schemeClr val="accent6"/>
+          </a:fillRef>
+          <a:effectRef idx="1">
+            <a:schemeClr val="accent6"/>
+          </a:effectRef>
+          <a:fontRef idx="minor">
+            <a:schemeClr val="dk1"/>
+          </a:fontRef>
+        </p:style>
+        <p:txBody>
+          <a:bodyPr rtlCol="0" anchor="ctr"/>
+          <a:lstStyle/>
+          <a:p>
+            <a:pPr algn="ctr"/>
+            <a:r>
+              <a:rPr lang="fr-FR" sz="1000" dirty="0">
+                <a:solidFill>
+                  <a:schemeClr val="tx1"/>
+                </a:solidFill>
+              </a:rPr>
+              <a:t>MesFrObservationBodyWeight</a:t>
+            </a:r>
+          </a:p>
+        </p:txBody>
+      </p:sp>
+      <p:sp>
+        <p:nvSpPr>
+          <p:cNvPr id="41" name="Rectangle à coins arrondis 40">
+            <a:extLst>
+              <a:ext uri="{FF2B5EF4-FFF2-40B4-BE49-F238E27FC236}">
+                <a16:creationId xmlns:a16="http://schemas.microsoft.com/office/drawing/2014/main" id="{6184A405-7410-EF9E-E023-B1BEF54562C7}"/>
+              </a:ext>
+            </a:extLst>
+          </p:cNvPr>
+          <p:cNvSpPr/>
+          <p:nvPr/>
+        </p:nvSpPr>
+        <p:spPr>
+          <a:xfrm>
+            <a:off x="6224452" y="3017657"/>
+            <a:ext cx="2689413" cy="280800"/>
+          </a:xfrm>
+          <a:prstGeom prst="roundRect">
+            <a:avLst/>
+          </a:prstGeom>
+          <a:ln/>
+        </p:spPr>
+        <p:style>
+          <a:lnRef idx="1">
+            <a:schemeClr val="accent6"/>
+          </a:lnRef>
+          <a:fillRef idx="2">
+            <a:schemeClr val="accent6"/>
+          </a:fillRef>
+          <a:effectRef idx="1">
+            <a:schemeClr val="accent6"/>
+          </a:effectRef>
+          <a:fontRef idx="minor">
+            <a:schemeClr val="dk1"/>
+          </a:fontRef>
+        </p:style>
+        <p:txBody>
+          <a:bodyPr rtlCol="0" anchor="ctr"/>
+          <a:lstStyle/>
+          <a:p>
+            <a:pPr algn="ctr"/>
+            <a:r>
+              <a:rPr lang="fr-FR" sz="1000" dirty="0">
+                <a:solidFill>
+                  <a:schemeClr val="tx1"/>
+                </a:solidFill>
+              </a:rPr>
+              <a:t>MesFrObservationBodyHeight</a:t>
+            </a:r>
+          </a:p>
+        </p:txBody>
+      </p:sp>
+      <p:sp>
+        <p:nvSpPr>
+          <p:cNvPr id="42" name="Rectangle à coins arrondis 41">
+            <a:extLst>
+              <a:ext uri="{FF2B5EF4-FFF2-40B4-BE49-F238E27FC236}">
+                <a16:creationId xmlns:a16="http://schemas.microsoft.com/office/drawing/2014/main" id="{E72AE87C-597C-3D20-371B-26CEABE1ECCE}"/>
+              </a:ext>
+            </a:extLst>
+          </p:cNvPr>
+          <p:cNvSpPr/>
+          <p:nvPr/>
+        </p:nvSpPr>
+        <p:spPr>
+          <a:xfrm>
+            <a:off x="6224452" y="3401346"/>
+            <a:ext cx="2689413" cy="280800"/>
+          </a:xfrm>
+          <a:prstGeom prst="roundRect">
+            <a:avLst/>
+          </a:prstGeom>
+          <a:ln/>
+        </p:spPr>
+        <p:style>
+          <a:lnRef idx="1">
+            <a:schemeClr val="accent6"/>
+          </a:lnRef>
+          <a:fillRef idx="2">
+            <a:schemeClr val="accent6"/>
+          </a:fillRef>
+          <a:effectRef idx="1">
+            <a:schemeClr val="accent6"/>
+          </a:effectRef>
+          <a:fontRef idx="minor">
+            <a:schemeClr val="dk1"/>
+          </a:fontRef>
+        </p:style>
+        <p:txBody>
+          <a:bodyPr rtlCol="0" anchor="ctr"/>
+          <a:lstStyle/>
+          <a:p>
+            <a:pPr algn="ctr"/>
+            <a:r>
+              <a:rPr lang="fr-FR" sz="1000" dirty="0">
+                <a:solidFill>
+                  <a:schemeClr val="tx1"/>
+                </a:solidFill>
+              </a:rPr>
+              <a:t>MesFrObservationBodyTemperature</a:t>
+            </a:r>
+          </a:p>
+        </p:txBody>
+      </p:sp>
+      <p:sp>
+        <p:nvSpPr>
+          <p:cNvPr id="45" name="Rectangle à coins arrondis 44">
+            <a:extLst>
+              <a:ext uri="{FF2B5EF4-FFF2-40B4-BE49-F238E27FC236}">
+                <a16:creationId xmlns:a16="http://schemas.microsoft.com/office/drawing/2014/main" id="{6C7B2439-EDEF-1A27-A1F0-737E71CA2E99}"/>
+              </a:ext>
+            </a:extLst>
+          </p:cNvPr>
+          <p:cNvSpPr/>
+          <p:nvPr/>
+        </p:nvSpPr>
+        <p:spPr>
+          <a:xfrm>
+            <a:off x="6860948" y="1207703"/>
+            <a:ext cx="2052917" cy="258637"/>
+          </a:xfrm>
+          <a:prstGeom prst="roundRect">
+            <a:avLst/>
+          </a:prstGeom>
+          <a:ln/>
+        </p:spPr>
+        <p:style>
+          <a:lnRef idx="1">
+            <a:schemeClr val="accent6"/>
+          </a:lnRef>
+          <a:fillRef idx="2">
+            <a:schemeClr val="accent6"/>
+          </a:fillRef>
+          <a:effectRef idx="1">
+            <a:schemeClr val="accent6"/>
+          </a:effectRef>
+          <a:fontRef idx="minor">
+            <a:schemeClr val="dk1"/>
+          </a:fontRef>
+        </p:style>
+        <p:txBody>
+          <a:bodyPr rtlCol="0" anchor="ctr"/>
+          <a:lstStyle/>
+          <a:p>
+            <a:pPr algn="ctr"/>
+            <a:r>
+              <a:rPr lang="fr-FR" sz="1200" dirty="0">
+                <a:solidFill>
+                  <a:schemeClr val="tx1"/>
+                </a:solidFill>
+              </a:rPr>
+              <a:t>Profils mesures</a:t>
+            </a:r>
+          </a:p>
+        </p:txBody>
+      </p:sp>
+      <p:sp>
+        <p:nvSpPr>
+          <p:cNvPr id="47" name="Rectangle à coins arrondis 46">
+            <a:extLst>
+              <a:ext uri="{FF2B5EF4-FFF2-40B4-BE49-F238E27FC236}">
+                <a16:creationId xmlns:a16="http://schemas.microsoft.com/office/drawing/2014/main" id="{B4A3BFCE-C16E-B811-9A54-F1F0B0FBF786}"/>
+              </a:ext>
+            </a:extLst>
+          </p:cNvPr>
+          <p:cNvSpPr/>
+          <p:nvPr/>
+        </p:nvSpPr>
+        <p:spPr>
+          <a:xfrm>
+            <a:off x="1331900" y="5729935"/>
+            <a:ext cx="2685864" cy="280800"/>
+          </a:xfrm>
+          <a:prstGeom prst="roundRect">
+            <a:avLst/>
+          </a:prstGeom>
+          <a:ln/>
+        </p:spPr>
+        <p:style>
+          <a:lnRef idx="1">
+            <a:schemeClr val="accent6"/>
+          </a:lnRef>
+          <a:fillRef idx="2">
+            <a:schemeClr val="accent6"/>
+          </a:fillRef>
+          <a:effectRef idx="1">
+            <a:schemeClr val="accent6"/>
+          </a:effectRef>
+          <a:fontRef idx="minor">
+            <a:schemeClr val="dk1"/>
+          </a:fontRef>
+        </p:style>
+        <p:txBody>
+          <a:bodyPr rtlCol="0" anchor="ctr"/>
+          <a:lstStyle/>
+          <a:p>
+            <a:pPr algn="ctr"/>
+            <a:r>
+              <a:rPr lang="fr-FR" sz="1000" dirty="0">
+                <a:solidFill>
+                  <a:schemeClr val="tx1"/>
+                </a:solidFill>
+              </a:rPr>
+              <a:t>MesObservationStepsByDay</a:t>
+            </a:r>
+          </a:p>
+        </p:txBody>
+      </p:sp>
+      <p:sp>
+        <p:nvSpPr>
+          <p:cNvPr id="48" name="Rectangle à coins arrondis 47">
+            <a:extLst>
+              <a:ext uri="{FF2B5EF4-FFF2-40B4-BE49-F238E27FC236}">
+                <a16:creationId xmlns:a16="http://schemas.microsoft.com/office/drawing/2014/main" id="{E1C4FDC7-BA48-E30D-7B69-5D10C263FA84}"/>
+              </a:ext>
+            </a:extLst>
+          </p:cNvPr>
+          <p:cNvSpPr/>
+          <p:nvPr/>
+        </p:nvSpPr>
+        <p:spPr>
+          <a:xfrm>
+            <a:off x="1319552" y="5002914"/>
+            <a:ext cx="2685864" cy="280800"/>
+          </a:xfrm>
+          <a:prstGeom prst="roundRect">
+            <a:avLst/>
+          </a:prstGeom>
+          <a:ln/>
+        </p:spPr>
+        <p:style>
+          <a:lnRef idx="1">
+            <a:schemeClr val="accent6"/>
+          </a:lnRef>
+          <a:fillRef idx="2">
+            <a:schemeClr val="accent6"/>
+          </a:fillRef>
+          <a:effectRef idx="1">
+            <a:schemeClr val="accent6"/>
+          </a:effectRef>
+          <a:fontRef idx="minor">
+            <a:schemeClr val="dk1"/>
+          </a:fontRef>
+        </p:style>
+        <p:txBody>
+          <a:bodyPr rtlCol="0" anchor="ctr"/>
+          <a:lstStyle/>
+          <a:p>
+            <a:pPr algn="ctr"/>
+            <a:r>
+              <a:rPr lang="fr-FR" sz="1000" dirty="0">
+                <a:solidFill>
+                  <a:schemeClr val="tx1"/>
+                </a:solidFill>
+              </a:rPr>
+              <a:t>MesObservationPainSeverity</a:t>
+            </a:r>
+          </a:p>
+        </p:txBody>
+      </p:sp>
+      <p:sp>
+        <p:nvSpPr>
+          <p:cNvPr id="49" name="Rectangle à coins arrondis 48">
+            <a:extLst>
+              <a:ext uri="{FF2B5EF4-FFF2-40B4-BE49-F238E27FC236}">
+                <a16:creationId xmlns:a16="http://schemas.microsoft.com/office/drawing/2014/main" id="{3839B3AF-C197-9A34-F5F6-E25A1035A70D}"/>
+              </a:ext>
+            </a:extLst>
+          </p:cNvPr>
+          <p:cNvSpPr/>
+          <p:nvPr/>
+        </p:nvSpPr>
+        <p:spPr>
+          <a:xfrm>
+            <a:off x="1331900" y="5388476"/>
+            <a:ext cx="2685864" cy="280800"/>
+          </a:xfrm>
+          <a:prstGeom prst="roundRect">
+            <a:avLst/>
+          </a:prstGeom>
+          <a:ln/>
+        </p:spPr>
+        <p:style>
+          <a:lnRef idx="1">
+            <a:schemeClr val="accent6"/>
+          </a:lnRef>
+          <a:fillRef idx="2">
+            <a:schemeClr val="accent6"/>
+          </a:fillRef>
+          <a:effectRef idx="1">
+            <a:schemeClr val="accent6"/>
+          </a:effectRef>
+          <a:fontRef idx="minor">
+            <a:schemeClr val="dk1"/>
+          </a:fontRef>
+        </p:style>
+        <p:txBody>
+          <a:bodyPr rtlCol="0" anchor="ctr"/>
+          <a:lstStyle/>
+          <a:p>
+            <a:pPr algn="ctr"/>
+            <a:r>
+              <a:rPr lang="fr-FR" sz="1000" dirty="0">
+                <a:solidFill>
+                  <a:schemeClr val="tx1"/>
+                </a:solidFill>
+              </a:rPr>
+              <a:t>MesObservationWaistCircumference</a:t>
+            </a:r>
+          </a:p>
+        </p:txBody>
+      </p:sp>
+      <p:sp>
+        <p:nvSpPr>
+          <p:cNvPr id="50" name="Rectangle à coins arrondis 49">
+            <a:extLst>
+              <a:ext uri="{FF2B5EF4-FFF2-40B4-BE49-F238E27FC236}">
+                <a16:creationId xmlns:a16="http://schemas.microsoft.com/office/drawing/2014/main" id="{9C09F461-E3E9-1C79-1E3A-CB22A5219045}"/>
+              </a:ext>
+            </a:extLst>
+          </p:cNvPr>
+          <p:cNvSpPr/>
+          <p:nvPr/>
+        </p:nvSpPr>
+        <p:spPr>
+          <a:xfrm>
+            <a:off x="1325004" y="3801331"/>
+            <a:ext cx="1653052" cy="308384"/>
+          </a:xfrm>
+          <a:prstGeom prst="roundRect">
+            <a:avLst/>
+          </a:prstGeom>
+          <a:ln/>
+        </p:spPr>
+        <p:style>
+          <a:lnRef idx="1">
+            <a:schemeClr val="accent1"/>
+          </a:lnRef>
+          <a:fillRef idx="2">
+            <a:schemeClr val="accent1"/>
+          </a:fillRef>
+          <a:effectRef idx="1">
+            <a:schemeClr val="accent1"/>
+          </a:effectRef>
+          <a:fontRef idx="minor">
+            <a:schemeClr val="dk1"/>
+          </a:fontRef>
+        </p:style>
+        <p:txBody>
+          <a:bodyPr rtlCol="0" anchor="ctr"/>
+          <a:lstStyle/>
+          <a:p>
+            <a:pPr algn="ctr"/>
+            <a:r>
+              <a:rPr lang="fr-FR" sz="1200" dirty="0">
+                <a:solidFill>
+                  <a:schemeClr val="tx1"/>
+                </a:solidFill>
+              </a:rPr>
+              <a:t>bloodpressure</a:t>
+            </a:r>
+          </a:p>
+        </p:txBody>
+      </p:sp>
+      <p:cxnSp>
+        <p:nvCxnSpPr>
+          <p:cNvPr id="51" name="Connecteur droit avec flèche 50">
+            <a:extLst>
+              <a:ext uri="{FF2B5EF4-FFF2-40B4-BE49-F238E27FC236}">
+                <a16:creationId xmlns:a16="http://schemas.microsoft.com/office/drawing/2014/main" id="{D00FA9F2-FAD0-851A-9162-DE3079F97812}"/>
+              </a:ext>
+            </a:extLst>
+          </p:cNvPr>
+          <p:cNvCxnSpPr>
+            <a:cxnSpLocks/>
+            <a:stCxn id="8" idx="2"/>
+            <a:endCxn id="50" idx="1"/>
+          </p:cNvCxnSpPr>
+          <p:nvPr/>
+        </p:nvCxnSpPr>
+        <p:spPr>
+          <a:xfrm rot="16200000" flipH="1">
+            <a:off x="-57831" y="2572688"/>
+            <a:ext cx="2329786" cy="435883"/>
+          </a:xfrm>
+          <a:prstGeom prst="bentConnector2">
+            <a:avLst/>
+          </a:prstGeom>
+          <a:ln>
+            <a:solidFill>
+              <a:schemeClr val="tx1"/>
+            </a:solidFill>
+            <a:tailEnd type="triangle"/>
+          </a:ln>
+        </p:spPr>
+        <p:style>
+          <a:lnRef idx="1">
+            <a:schemeClr val="accent1"/>
+          </a:lnRef>
+          <a:fillRef idx="0">
+            <a:schemeClr val="accent1"/>
+          </a:fillRef>
+          <a:effectRef idx="0">
+            <a:schemeClr val="accent1"/>
+          </a:effectRef>
+          <a:fontRef idx="minor">
+            <a:schemeClr val="tx1"/>
+          </a:fontRef>
+        </p:style>
+      </p:cxnSp>
+      <p:cxnSp>
+        <p:nvCxnSpPr>
+          <p:cNvPr id="69" name="Connecteur droit 68">
+            <a:extLst>
+              <a:ext uri="{FF2B5EF4-FFF2-40B4-BE49-F238E27FC236}">
+                <a16:creationId xmlns:a16="http://schemas.microsoft.com/office/drawing/2014/main" id="{145CD999-E692-C520-F877-E4560C4BEC18}"/>
+              </a:ext>
+            </a:extLst>
+          </p:cNvPr>
+          <p:cNvCxnSpPr>
+            <a:cxnSpLocks/>
+            <a:stCxn id="8" idx="2"/>
+            <a:endCxn id="48" idx="1"/>
+          </p:cNvCxnSpPr>
+          <p:nvPr/>
+        </p:nvCxnSpPr>
+        <p:spPr>
+          <a:xfrm rot="16200000" flipH="1">
+            <a:off x="-654452" y="3169309"/>
+            <a:ext cx="3517577" cy="430431"/>
+          </a:xfrm>
+          <a:prstGeom prst="bentConnector2">
+            <a:avLst/>
+          </a:prstGeom>
+          <a:ln>
+            <a:solidFill>
+              <a:schemeClr val="tx1"/>
+            </a:solidFill>
+            <a:tailEnd type="triangle"/>
+          </a:ln>
+        </p:spPr>
+        <p:style>
+          <a:lnRef idx="1">
+            <a:schemeClr val="accent1"/>
+          </a:lnRef>
+          <a:fillRef idx="0">
+            <a:schemeClr val="accent1"/>
+          </a:fillRef>
+          <a:effectRef idx="0">
+            <a:schemeClr val="accent1"/>
+          </a:effectRef>
+          <a:fontRef idx="minor">
+            <a:schemeClr val="tx1"/>
+          </a:fontRef>
+        </p:style>
+      </p:cxnSp>
+      <p:cxnSp>
+        <p:nvCxnSpPr>
+          <p:cNvPr id="91" name="Connecteur droit 68">
+            <a:extLst>
+              <a:ext uri="{FF2B5EF4-FFF2-40B4-BE49-F238E27FC236}">
+                <a16:creationId xmlns:a16="http://schemas.microsoft.com/office/drawing/2014/main" id="{F9E06D08-4481-EED3-4ACC-790E529E53A1}"/>
+              </a:ext>
+            </a:extLst>
+          </p:cNvPr>
+          <p:cNvCxnSpPr>
+            <a:cxnSpLocks/>
+            <a:stCxn id="8" idx="2"/>
+            <a:endCxn id="49" idx="1"/>
+          </p:cNvCxnSpPr>
+          <p:nvPr/>
+        </p:nvCxnSpPr>
+        <p:spPr>
+          <a:xfrm rot="16200000" flipH="1">
+            <a:off x="-841059" y="3355916"/>
+            <a:ext cx="3903139" cy="442779"/>
+          </a:xfrm>
+          <a:prstGeom prst="bentConnector2">
+            <a:avLst/>
+          </a:prstGeom>
+          <a:ln>
+            <a:solidFill>
+              <a:schemeClr val="tx1"/>
+            </a:solidFill>
+            <a:tailEnd type="triangle"/>
+          </a:ln>
+        </p:spPr>
+        <p:style>
+          <a:lnRef idx="1">
+            <a:schemeClr val="accent1"/>
+          </a:lnRef>
+          <a:fillRef idx="0">
+            <a:schemeClr val="accent1"/>
+          </a:fillRef>
+          <a:effectRef idx="0">
+            <a:schemeClr val="accent1"/>
+          </a:effectRef>
+          <a:fontRef idx="minor">
+            <a:schemeClr val="tx1"/>
+          </a:fontRef>
+        </p:style>
+      </p:cxnSp>
+      <p:cxnSp>
+        <p:nvCxnSpPr>
+          <p:cNvPr id="94" name="Connecteur droit 68">
+            <a:extLst>
+              <a:ext uri="{FF2B5EF4-FFF2-40B4-BE49-F238E27FC236}">
+                <a16:creationId xmlns:a16="http://schemas.microsoft.com/office/drawing/2014/main" id="{2DE882B5-59F9-6153-8759-410E2294C8B4}"/>
+              </a:ext>
+            </a:extLst>
+          </p:cNvPr>
+          <p:cNvCxnSpPr>
+            <a:cxnSpLocks/>
+            <a:stCxn id="8" idx="2"/>
+            <a:endCxn id="47" idx="1"/>
+          </p:cNvCxnSpPr>
+          <p:nvPr/>
+        </p:nvCxnSpPr>
+        <p:spPr>
+          <a:xfrm rot="16200000" flipH="1">
+            <a:off x="-1011789" y="3526646"/>
+            <a:ext cx="4244598" cy="442779"/>
+          </a:xfrm>
+          <a:prstGeom prst="bentConnector2">
+            <a:avLst/>
+          </a:prstGeom>
+          <a:ln>
+            <a:solidFill>
+              <a:schemeClr val="tx1"/>
+            </a:solidFill>
+            <a:tailEnd type="triangle"/>
+          </a:ln>
+        </p:spPr>
+        <p:style>
+          <a:lnRef idx="1">
+            <a:schemeClr val="accent1"/>
+          </a:lnRef>
+          <a:fillRef idx="0">
+            <a:schemeClr val="accent1"/>
+          </a:fillRef>
+          <a:effectRef idx="0">
+            <a:schemeClr val="accent1"/>
+          </a:effectRef>
+          <a:fontRef idx="minor">
+            <a:schemeClr val="tx1"/>
+          </a:fontRef>
+        </p:style>
+      </p:cxnSp>
+      <p:cxnSp>
+        <p:nvCxnSpPr>
+          <p:cNvPr id="97" name="Connecteur droit avec flèche 96">
+            <a:extLst>
+              <a:ext uri="{FF2B5EF4-FFF2-40B4-BE49-F238E27FC236}">
+                <a16:creationId xmlns:a16="http://schemas.microsoft.com/office/drawing/2014/main" id="{7EC28E73-67D6-2E2C-2508-973E2F9AE1F8}"/>
+              </a:ext>
+            </a:extLst>
+          </p:cNvPr>
+          <p:cNvCxnSpPr>
+            <a:cxnSpLocks/>
+            <a:stCxn id="50" idx="3"/>
+            <a:endCxn id="98" idx="1"/>
+          </p:cNvCxnSpPr>
+          <p:nvPr/>
+        </p:nvCxnSpPr>
+        <p:spPr>
+          <a:xfrm>
+            <a:off x="2978056" y="3955523"/>
+            <a:ext cx="516405" cy="3643"/>
+          </a:xfrm>
+          <a:prstGeom prst="straightConnector1">
+            <a:avLst/>
+          </a:prstGeom>
+          <a:ln>
+            <a:solidFill>
+              <a:schemeClr val="tx1"/>
+            </a:solidFill>
+            <a:tailEnd type="triangle"/>
+          </a:ln>
+        </p:spPr>
+        <p:style>
+          <a:lnRef idx="1">
+            <a:schemeClr val="accent1"/>
+          </a:lnRef>
+          <a:fillRef idx="0">
+            <a:schemeClr val="accent1"/>
+          </a:fillRef>
+          <a:effectRef idx="0">
+            <a:schemeClr val="accent1"/>
+          </a:effectRef>
+          <a:fontRef idx="minor">
+            <a:schemeClr val="tx1"/>
+          </a:fontRef>
+        </p:style>
+      </p:cxnSp>
+      <p:sp>
+        <p:nvSpPr>
+          <p:cNvPr id="98" name="Rectangle à coins arrondis 97">
+            <a:extLst>
+              <a:ext uri="{FF2B5EF4-FFF2-40B4-BE49-F238E27FC236}">
+                <a16:creationId xmlns:a16="http://schemas.microsoft.com/office/drawing/2014/main" id="{4B6B9DA8-02AA-6A2F-C19F-CF4A46EED308}"/>
+              </a:ext>
+            </a:extLst>
+          </p:cNvPr>
+          <p:cNvSpPr/>
+          <p:nvPr/>
+        </p:nvSpPr>
+        <p:spPr>
+          <a:xfrm>
+            <a:off x="3494461" y="3801612"/>
+            <a:ext cx="2225935" cy="315108"/>
+          </a:xfrm>
+          <a:prstGeom prst="roundRect">
+            <a:avLst/>
+          </a:prstGeom>
+          <a:ln/>
+        </p:spPr>
+        <p:style>
+          <a:lnRef idx="1">
+            <a:schemeClr val="accent4"/>
+          </a:lnRef>
+          <a:fillRef idx="2">
+            <a:schemeClr val="accent4"/>
+          </a:fillRef>
+          <a:effectRef idx="1">
+            <a:schemeClr val="accent4"/>
+          </a:effectRef>
+          <a:fontRef idx="minor">
+            <a:schemeClr val="dk1"/>
+          </a:fontRef>
+        </p:style>
+        <p:txBody>
+          <a:bodyPr rtlCol="0" anchor="ctr"/>
+          <a:lstStyle/>
+          <a:p>
+            <a:pPr algn="ctr"/>
+            <a:r>
+              <a:rPr lang="fr-FR" sz="1200">
+                <a:solidFill>
+                  <a:schemeClr val="tx1"/>
+                </a:solidFill>
+              </a:rPr>
+              <a:t>FrObservationBP</a:t>
+            </a:r>
+          </a:p>
+        </p:txBody>
+      </p:sp>
+      <p:cxnSp>
+        <p:nvCxnSpPr>
+          <p:cNvPr id="99" name="Connecteur droit avec flèche 98">
+            <a:extLst>
+              <a:ext uri="{FF2B5EF4-FFF2-40B4-BE49-F238E27FC236}">
+                <a16:creationId xmlns:a16="http://schemas.microsoft.com/office/drawing/2014/main" id="{FCDB4C03-C4F1-0894-046A-666275EC4311}"/>
+              </a:ext>
+            </a:extLst>
+          </p:cNvPr>
+          <p:cNvCxnSpPr>
+            <a:stCxn id="98" idx="3"/>
+            <a:endCxn id="100" idx="1"/>
+          </p:cNvCxnSpPr>
+          <p:nvPr/>
+        </p:nvCxnSpPr>
+        <p:spPr>
+          <a:xfrm>
+            <a:off x="5720396" y="3959166"/>
+            <a:ext cx="504055" cy="111"/>
+          </a:xfrm>
+          <a:prstGeom prst="straightConnector1">
+            <a:avLst/>
+          </a:prstGeom>
+          <a:ln>
+            <a:solidFill>
+              <a:schemeClr val="tx1"/>
+            </a:solidFill>
+            <a:tailEnd type="triangle"/>
+          </a:ln>
+        </p:spPr>
+        <p:style>
+          <a:lnRef idx="1">
+            <a:schemeClr val="accent1"/>
+          </a:lnRef>
+          <a:fillRef idx="0">
+            <a:schemeClr val="accent1"/>
+          </a:fillRef>
+          <a:effectRef idx="0">
+            <a:schemeClr val="accent1"/>
+          </a:effectRef>
+          <a:fontRef idx="minor">
+            <a:schemeClr val="tx1"/>
+          </a:fontRef>
+        </p:style>
+      </p:cxnSp>
+      <p:sp>
+        <p:nvSpPr>
+          <p:cNvPr id="100" name="Rectangle à coins arrondis 99">
+            <a:extLst>
+              <a:ext uri="{FF2B5EF4-FFF2-40B4-BE49-F238E27FC236}">
+                <a16:creationId xmlns:a16="http://schemas.microsoft.com/office/drawing/2014/main" id="{DA105B94-62C1-E727-7E8F-AEF02AAE97E2}"/>
+              </a:ext>
+            </a:extLst>
+          </p:cNvPr>
+          <p:cNvSpPr/>
+          <p:nvPr/>
+        </p:nvSpPr>
+        <p:spPr>
+          <a:xfrm>
+            <a:off x="6224451" y="3818877"/>
+            <a:ext cx="2689413" cy="280800"/>
+          </a:xfrm>
+          <a:prstGeom prst="roundRect">
+            <a:avLst/>
+          </a:prstGeom>
+          <a:ln/>
+        </p:spPr>
+        <p:style>
+          <a:lnRef idx="1">
+            <a:schemeClr val="accent6"/>
+          </a:lnRef>
+          <a:fillRef idx="2">
+            <a:schemeClr val="accent6"/>
+          </a:fillRef>
+          <a:effectRef idx="1">
+            <a:schemeClr val="accent6"/>
+          </a:effectRef>
+          <a:fontRef idx="minor">
+            <a:schemeClr val="dk1"/>
+          </a:fontRef>
+        </p:style>
+        <p:txBody>
+          <a:bodyPr rtlCol="0" anchor="ctr"/>
+          <a:lstStyle/>
+          <a:p>
+            <a:pPr algn="ctr"/>
+            <a:r>
+              <a:rPr lang="fr-FR" sz="1000" dirty="0">
+                <a:solidFill>
+                  <a:schemeClr val="tx1"/>
+                </a:solidFill>
+              </a:rPr>
+              <a:t>MesFrObservationBP</a:t>
+            </a:r>
+          </a:p>
+        </p:txBody>
+      </p:sp>
+      <p:sp>
+        <p:nvSpPr>
+          <p:cNvPr id="53" name="Rectangle à coins arrondis 46">
+            <a:extLst>
+              <a:ext uri="{FF2B5EF4-FFF2-40B4-BE49-F238E27FC236}">
+                <a16:creationId xmlns:a16="http://schemas.microsoft.com/office/drawing/2014/main" id="{1E5F0EBA-D0C3-3945-A1F0-1AE925811475}"/>
+              </a:ext>
+            </a:extLst>
+          </p:cNvPr>
+          <p:cNvSpPr/>
+          <p:nvPr/>
+        </p:nvSpPr>
+        <p:spPr>
+          <a:xfrm>
+            <a:off x="1331900" y="6121229"/>
+            <a:ext cx="2685864" cy="280800"/>
+          </a:xfrm>
+          <a:prstGeom prst="roundRect">
+            <a:avLst/>
+          </a:prstGeom>
+          <a:ln/>
+        </p:spPr>
+        <p:style>
+          <a:lnRef idx="1">
+            <a:schemeClr val="accent6"/>
+          </a:lnRef>
+          <a:fillRef idx="2">
+            <a:schemeClr val="accent6"/>
+          </a:fillRef>
+          <a:effectRef idx="1">
+            <a:schemeClr val="accent6"/>
+          </a:effectRef>
+          <a:fontRef idx="minor">
+            <a:schemeClr val="dk1"/>
+          </a:fontRef>
+        </p:style>
+        <p:txBody>
+          <a:bodyPr rtlCol="0" anchor="ctr"/>
+          <a:lstStyle/>
+          <a:p>
+            <a:pPr algn="ctr"/>
+            <a:r>
+              <a:rPr lang="fr-FR" sz="1000" dirty="0">
+                <a:solidFill>
+                  <a:schemeClr val="tx1"/>
+                </a:solidFill>
+              </a:rPr>
+              <a:t>MesObservationGlucose</a:t>
+            </a:r>
+          </a:p>
+        </p:txBody>
+      </p:sp>
+      <p:cxnSp>
+        <p:nvCxnSpPr>
+          <p:cNvPr id="54" name="Connecteur droit 68">
+            <a:extLst>
+              <a:ext uri="{FF2B5EF4-FFF2-40B4-BE49-F238E27FC236}">
+                <a16:creationId xmlns:a16="http://schemas.microsoft.com/office/drawing/2014/main" id="{7980E821-4D77-3683-B941-04BE79EF8281}"/>
+              </a:ext>
+            </a:extLst>
+          </p:cNvPr>
+          <p:cNvCxnSpPr>
+            <a:cxnSpLocks/>
+            <a:stCxn id="8" idx="2"/>
+            <a:endCxn id="53" idx="1"/>
+          </p:cNvCxnSpPr>
+          <p:nvPr/>
+        </p:nvCxnSpPr>
+        <p:spPr>
+          <a:xfrm rot="16200000" flipH="1">
+            <a:off x="-1207436" y="3722293"/>
+            <a:ext cx="4635892" cy="442779"/>
+          </a:xfrm>
+          <a:prstGeom prst="bentConnector2">
+            <a:avLst/>
+          </a:prstGeom>
+          <a:ln>
+            <a:solidFill>
+              <a:schemeClr val="tx1"/>
+            </a:solidFill>
+            <a:tailEnd type="triangle"/>
+          </a:ln>
+        </p:spPr>
+        <p:style>
+          <a:lnRef idx="1">
+            <a:schemeClr val="accent1"/>
+          </a:lnRef>
+          <a:fillRef idx="0">
+            <a:schemeClr val="accent1"/>
+          </a:fillRef>
+          <a:effectRef idx="0">
+            <a:schemeClr val="accent1"/>
+          </a:effectRef>
+          <a:fontRef idx="minor">
+            <a:schemeClr val="tx1"/>
+          </a:fontRef>
+        </p:style>
+      </p:cxnSp>
+      <p:sp>
+        <p:nvSpPr>
+          <p:cNvPr id="55" name="Rectangle à coins arrondis 46">
+            <a:extLst>
+              <a:ext uri="{FF2B5EF4-FFF2-40B4-BE49-F238E27FC236}">
+                <a16:creationId xmlns:a16="http://schemas.microsoft.com/office/drawing/2014/main" id="{71CBB417-0B84-FE7E-68B8-381C83D57A7F}"/>
+              </a:ext>
+            </a:extLst>
+          </p:cNvPr>
+          <p:cNvSpPr/>
+          <p:nvPr/>
+        </p:nvSpPr>
+        <p:spPr>
+          <a:xfrm>
+            <a:off x="1331900" y="6472493"/>
+            <a:ext cx="2685864" cy="280800"/>
+          </a:xfrm>
+          <a:prstGeom prst="roundRect">
+            <a:avLst/>
+          </a:prstGeom>
+          <a:ln/>
+        </p:spPr>
+        <p:style>
+          <a:lnRef idx="1">
+            <a:schemeClr val="accent6"/>
+          </a:lnRef>
+          <a:fillRef idx="2">
+            <a:schemeClr val="accent6"/>
+          </a:fillRef>
+          <a:effectRef idx="1">
+            <a:schemeClr val="accent6"/>
+          </a:effectRef>
+          <a:fontRef idx="minor">
+            <a:schemeClr val="dk1"/>
+          </a:fontRef>
+        </p:style>
+        <p:txBody>
+          <a:bodyPr rtlCol="0" anchor="ctr"/>
+          <a:lstStyle/>
+          <a:p>
+            <a:pPr algn="ctr"/>
+            <a:r>
+              <a:rPr lang="fr-FR" sz="1000" dirty="0">
+                <a:solidFill>
+                  <a:schemeClr val="tx1"/>
+                </a:solidFill>
+              </a:rPr>
+              <a:t>MesObservationHeadCircumference</a:t>
+            </a:r>
+          </a:p>
+        </p:txBody>
+      </p:sp>
+      <p:cxnSp>
+        <p:nvCxnSpPr>
+          <p:cNvPr id="56" name="Connecteur droit 68">
+            <a:extLst>
+              <a:ext uri="{FF2B5EF4-FFF2-40B4-BE49-F238E27FC236}">
+                <a16:creationId xmlns:a16="http://schemas.microsoft.com/office/drawing/2014/main" id="{A0B9B47C-B41F-9BA5-DEE0-0CF232A9A753}"/>
+              </a:ext>
+            </a:extLst>
+          </p:cNvPr>
+          <p:cNvCxnSpPr>
+            <a:cxnSpLocks/>
+            <a:stCxn id="8" idx="2"/>
+            <a:endCxn id="55" idx="1"/>
+          </p:cNvCxnSpPr>
+          <p:nvPr/>
+        </p:nvCxnSpPr>
+        <p:spPr>
+          <a:xfrm rot="16200000" flipH="1">
+            <a:off x="-1383068" y="3897925"/>
+            <a:ext cx="4987156" cy="442779"/>
+          </a:xfrm>
+          <a:prstGeom prst="bentConnector2">
+            <a:avLst/>
+          </a:prstGeom>
+          <a:ln>
+            <a:solidFill>
+              <a:schemeClr val="tx1"/>
+            </a:solidFill>
+            <a:tailEnd type="triangle"/>
+          </a:ln>
+        </p:spPr>
+        <p:style>
+          <a:lnRef idx="1">
+            <a:schemeClr val="accent1"/>
+          </a:lnRef>
+          <a:fillRef idx="0">
+            <a:schemeClr val="accent1"/>
+          </a:fillRef>
+          <a:effectRef idx="0">
+            <a:schemeClr val="accent1"/>
+          </a:effectRef>
+          <a:fontRef idx="minor">
+            <a:schemeClr val="tx1"/>
+          </a:fontRef>
+        </p:style>
+      </p:cxnSp>
+      <p:sp>
+        <p:nvSpPr>
+          <p:cNvPr id="2" name="Rectangle à coins arrondis 3">
+            <a:extLst>
+              <a:ext uri="{FF2B5EF4-FFF2-40B4-BE49-F238E27FC236}">
+                <a16:creationId xmlns:a16="http://schemas.microsoft.com/office/drawing/2014/main" id="{7C3D9EAB-CBA0-4AF4-F3F4-8FEAC03357B5}"/>
+              </a:ext>
+            </a:extLst>
+          </p:cNvPr>
+          <p:cNvSpPr/>
+          <p:nvPr/>
+        </p:nvSpPr>
+        <p:spPr>
+          <a:xfrm>
+            <a:off x="2453203" y="106089"/>
+            <a:ext cx="1449050" cy="1021976"/>
+          </a:xfrm>
+          <a:prstGeom prst="roundRect">
+            <a:avLst/>
+          </a:prstGeom>
+        </p:spPr>
+        <p:style>
+          <a:lnRef idx="2">
+            <a:schemeClr val="accent1">
+              <a:shade val="50000"/>
+            </a:schemeClr>
+          </a:lnRef>
+          <a:fillRef idx="1">
+            <a:schemeClr val="accent1"/>
+          </a:fillRef>
+          <a:effectRef idx="0">
+            <a:schemeClr val="accent1"/>
+          </a:effectRef>
+          <a:fontRef idx="minor">
+            <a:schemeClr val="lt1"/>
+          </a:fontRef>
+        </p:style>
+        <p:txBody>
+          <a:bodyPr rtlCol="0" anchor="ctr"/>
+          <a:lstStyle/>
+          <a:p>
+            <a:pPr algn="ctr"/>
+            <a:r>
+              <a:rPr lang="fr-FR" dirty="0"/>
+              <a:t>Bundle</a:t>
+            </a:r>
+          </a:p>
+        </p:txBody>
+      </p:sp>
+      <p:sp>
+        <p:nvSpPr>
+          <p:cNvPr id="3" name="Rectangle à coins arrondis 7">
+            <a:extLst>
+              <a:ext uri="{FF2B5EF4-FFF2-40B4-BE49-F238E27FC236}">
+                <a16:creationId xmlns:a16="http://schemas.microsoft.com/office/drawing/2014/main" id="{6D120D6B-A1C2-E16D-41DD-49C98293D13A}"/>
+              </a:ext>
+            </a:extLst>
+          </p:cNvPr>
+          <p:cNvSpPr/>
+          <p:nvPr/>
+        </p:nvSpPr>
+        <p:spPr>
+          <a:xfrm>
+            <a:off x="2064761" y="1329124"/>
+            <a:ext cx="2225935" cy="277906"/>
+          </a:xfrm>
+          <a:prstGeom prst="roundRect">
+            <a:avLst/>
+          </a:prstGeom>
+        </p:spPr>
+        <p:style>
+          <a:lnRef idx="1">
+            <a:schemeClr val="accent1"/>
+          </a:lnRef>
+          <a:fillRef idx="2">
+            <a:schemeClr val="accent1"/>
+          </a:fillRef>
+          <a:effectRef idx="1">
+            <a:schemeClr val="accent1"/>
+          </a:effectRef>
+          <a:fontRef idx="minor">
+            <a:schemeClr val="dk1"/>
+          </a:fontRef>
+        </p:style>
+        <p:txBody>
+          <a:bodyPr rtlCol="0" anchor="ctr"/>
+          <a:lstStyle/>
+          <a:p>
+            <a:pPr algn="ctr"/>
+            <a:r>
+              <a:rPr lang="fr-FR" sz="1200" dirty="0"/>
+              <a:t>MesBundleFluxAlimentation</a:t>
+            </a:r>
+            <a:endParaRPr lang="fr-FR" sz="1200" dirty="0">
+              <a:solidFill>
+                <a:schemeClr val="tx1"/>
+              </a:solidFill>
+            </a:endParaRPr>
+          </a:p>
+        </p:txBody>
+      </p:sp>
+      <p:cxnSp>
+        <p:nvCxnSpPr>
+          <p:cNvPr id="31" name="Connecteur droit avec flèche 30">
+            <a:extLst>
+              <a:ext uri="{FF2B5EF4-FFF2-40B4-BE49-F238E27FC236}">
+                <a16:creationId xmlns:a16="http://schemas.microsoft.com/office/drawing/2014/main" id="{00E8970E-597C-DAAD-4D7E-F9C87A7D4066}"/>
+              </a:ext>
+            </a:extLst>
+          </p:cNvPr>
+          <p:cNvCxnSpPr>
+            <a:cxnSpLocks/>
+            <a:stCxn id="2" idx="2"/>
+            <a:endCxn id="3" idx="0"/>
+          </p:cNvCxnSpPr>
+          <p:nvPr/>
+        </p:nvCxnSpPr>
+        <p:spPr>
+          <a:xfrm>
+            <a:off x="3177728" y="1128065"/>
+            <a:ext cx="1" cy="201059"/>
+          </a:xfrm>
+          <a:prstGeom prst="straightConnector1">
+            <a:avLst/>
+          </a:prstGeom>
+          <a:ln>
+            <a:solidFill>
+              <a:schemeClr val="tx1"/>
+            </a:solidFill>
+            <a:tailEnd type="triangle"/>
+          </a:ln>
+        </p:spPr>
+        <p:style>
+          <a:lnRef idx="1">
+            <a:schemeClr val="accent1"/>
+          </a:lnRef>
+          <a:fillRef idx="0">
+            <a:schemeClr val="accent1"/>
+          </a:fillRef>
+          <a:effectRef idx="0">
+            <a:schemeClr val="accent1"/>
+          </a:effectRef>
+          <a:fontRef idx="minor">
+            <a:schemeClr val="tx1"/>
+          </a:fontRef>
+        </p:style>
+      </p:cxnSp>
+      <p:sp>
+        <p:nvSpPr>
+          <p:cNvPr id="58" name="Rectangle à coins arrondis 49">
+            <a:extLst>
+              <a:ext uri="{FF2B5EF4-FFF2-40B4-BE49-F238E27FC236}">
+                <a16:creationId xmlns:a16="http://schemas.microsoft.com/office/drawing/2014/main" id="{B339EFEC-89E1-4EA0-D228-5B7F9DB47FE1}"/>
+              </a:ext>
+            </a:extLst>
+          </p:cNvPr>
+          <p:cNvSpPr/>
+          <p:nvPr/>
+        </p:nvSpPr>
+        <p:spPr>
+          <a:xfrm>
+            <a:off x="1319552" y="4189821"/>
+            <a:ext cx="1653052" cy="308384"/>
+          </a:xfrm>
+          <a:prstGeom prst="roundRect">
+            <a:avLst/>
+          </a:prstGeom>
+          <a:ln/>
+        </p:spPr>
+        <p:style>
+          <a:lnRef idx="1">
+            <a:schemeClr val="accent1"/>
+          </a:lnRef>
+          <a:fillRef idx="2">
+            <a:schemeClr val="accent1"/>
+          </a:fillRef>
+          <a:effectRef idx="1">
+            <a:schemeClr val="accent1"/>
+          </a:effectRef>
+          <a:fontRef idx="minor">
+            <a:schemeClr val="dk1"/>
+          </a:fontRef>
+        </p:style>
+        <p:txBody>
+          <a:bodyPr rtlCol="0" anchor="ctr"/>
+          <a:lstStyle/>
+          <a:p>
+            <a:pPr algn="ctr"/>
+            <a:r>
+              <a:rPr lang="fr-FR" sz="1200" dirty="0">
+                <a:solidFill>
+                  <a:schemeClr val="tx1"/>
+                </a:solidFill>
+              </a:rPr>
+              <a:t>oxygensat</a:t>
+            </a:r>
+          </a:p>
+        </p:txBody>
+      </p:sp>
+      <p:cxnSp>
+        <p:nvCxnSpPr>
+          <p:cNvPr id="59" name="Connecteur droit avec flèche 50">
+            <a:extLst>
+              <a:ext uri="{FF2B5EF4-FFF2-40B4-BE49-F238E27FC236}">
+                <a16:creationId xmlns:a16="http://schemas.microsoft.com/office/drawing/2014/main" id="{B324C41E-0E8B-A69A-FCDA-4445E1F3B89F}"/>
+              </a:ext>
+            </a:extLst>
+          </p:cNvPr>
+          <p:cNvCxnSpPr>
+            <a:cxnSpLocks/>
+            <a:stCxn id="8" idx="2"/>
+            <a:endCxn id="58" idx="1"/>
+          </p:cNvCxnSpPr>
+          <p:nvPr/>
+        </p:nvCxnSpPr>
+        <p:spPr>
+          <a:xfrm rot="16200000" flipH="1">
+            <a:off x="-254802" y="2769659"/>
+            <a:ext cx="2718276" cy="430431"/>
+          </a:xfrm>
+          <a:prstGeom prst="bentConnector2">
+            <a:avLst/>
+          </a:prstGeom>
+          <a:ln>
+            <a:solidFill>
+              <a:schemeClr val="tx1"/>
+            </a:solidFill>
+            <a:tailEnd type="triangle"/>
+          </a:ln>
+        </p:spPr>
+        <p:style>
+          <a:lnRef idx="1">
+            <a:schemeClr val="accent1"/>
+          </a:lnRef>
+          <a:fillRef idx="0">
+            <a:schemeClr val="accent1"/>
+          </a:fillRef>
+          <a:effectRef idx="0">
+            <a:schemeClr val="accent1"/>
+          </a:effectRef>
+          <a:fontRef idx="minor">
+            <a:schemeClr val="tx1"/>
+          </a:fontRef>
+        </p:style>
+      </p:cxnSp>
+      <p:cxnSp>
+        <p:nvCxnSpPr>
+          <p:cNvPr id="60" name="Connecteur droit avec flèche 59">
+            <a:extLst>
+              <a:ext uri="{FF2B5EF4-FFF2-40B4-BE49-F238E27FC236}">
+                <a16:creationId xmlns:a16="http://schemas.microsoft.com/office/drawing/2014/main" id="{A6891840-7332-3EA3-7E1B-8397632E6F71}"/>
+              </a:ext>
+            </a:extLst>
+          </p:cNvPr>
+          <p:cNvCxnSpPr>
+            <a:cxnSpLocks/>
+            <a:stCxn id="58" idx="3"/>
+            <a:endCxn id="61" idx="1"/>
+          </p:cNvCxnSpPr>
+          <p:nvPr/>
+        </p:nvCxnSpPr>
+        <p:spPr>
+          <a:xfrm>
+            <a:off x="2972604" y="4344013"/>
+            <a:ext cx="509509" cy="2495"/>
+          </a:xfrm>
+          <a:prstGeom prst="straightConnector1">
+            <a:avLst/>
+          </a:prstGeom>
+          <a:ln>
+            <a:solidFill>
+              <a:schemeClr val="tx1"/>
+            </a:solidFill>
+            <a:tailEnd type="triangle"/>
+          </a:ln>
+        </p:spPr>
+        <p:style>
+          <a:lnRef idx="1">
+            <a:schemeClr val="accent1"/>
+          </a:lnRef>
+          <a:fillRef idx="0">
+            <a:schemeClr val="accent1"/>
+          </a:fillRef>
+          <a:effectRef idx="0">
+            <a:schemeClr val="accent1"/>
+          </a:effectRef>
+          <a:fontRef idx="minor">
+            <a:schemeClr val="tx1"/>
+          </a:fontRef>
+        </p:style>
+      </p:cxnSp>
+      <p:sp>
+        <p:nvSpPr>
+          <p:cNvPr id="61" name="Rectangle à coins arrondis 97">
+            <a:extLst>
+              <a:ext uri="{FF2B5EF4-FFF2-40B4-BE49-F238E27FC236}">
+                <a16:creationId xmlns:a16="http://schemas.microsoft.com/office/drawing/2014/main" id="{7E7156FA-6BBB-2A80-665A-71F2550D0EC1}"/>
+              </a:ext>
+            </a:extLst>
+          </p:cNvPr>
+          <p:cNvSpPr/>
+          <p:nvPr/>
+        </p:nvSpPr>
+        <p:spPr>
+          <a:xfrm>
+            <a:off x="3482113" y="4188954"/>
+            <a:ext cx="2225935" cy="315108"/>
+          </a:xfrm>
+          <a:prstGeom prst="roundRect">
+            <a:avLst/>
+          </a:prstGeom>
+          <a:ln/>
+        </p:spPr>
+        <p:style>
+          <a:lnRef idx="1">
+            <a:schemeClr val="accent4"/>
+          </a:lnRef>
+          <a:fillRef idx="2">
+            <a:schemeClr val="accent4"/>
+          </a:fillRef>
+          <a:effectRef idx="1">
+            <a:schemeClr val="accent4"/>
+          </a:effectRef>
+          <a:fontRef idx="minor">
+            <a:schemeClr val="dk1"/>
+          </a:fontRef>
+        </p:style>
+        <p:txBody>
+          <a:bodyPr rtlCol="0" anchor="ctr"/>
+          <a:lstStyle/>
+          <a:p>
+            <a:pPr algn="ctr"/>
+            <a:r>
+              <a:rPr lang="fr-FR" sz="1200" dirty="0">
+                <a:solidFill>
+                  <a:schemeClr val="tx1"/>
+                </a:solidFill>
+              </a:rPr>
+              <a:t>FrObservationOxygenSaturation</a:t>
+            </a:r>
+          </a:p>
+        </p:txBody>
+      </p:sp>
+      <p:cxnSp>
+        <p:nvCxnSpPr>
+          <p:cNvPr id="62" name="Connecteur droit avec flèche 61">
+            <a:extLst>
+              <a:ext uri="{FF2B5EF4-FFF2-40B4-BE49-F238E27FC236}">
+                <a16:creationId xmlns:a16="http://schemas.microsoft.com/office/drawing/2014/main" id="{2E53963C-90FB-14E1-8368-E8E45D1FE420}"/>
+              </a:ext>
+            </a:extLst>
+          </p:cNvPr>
+          <p:cNvCxnSpPr>
+            <a:stCxn id="61" idx="3"/>
+            <a:endCxn id="63" idx="1"/>
+          </p:cNvCxnSpPr>
+          <p:nvPr/>
+        </p:nvCxnSpPr>
+        <p:spPr>
+          <a:xfrm flipV="1">
+            <a:off x="5708048" y="4344013"/>
+            <a:ext cx="504055" cy="2495"/>
+          </a:xfrm>
+          <a:prstGeom prst="straightConnector1">
+            <a:avLst/>
+          </a:prstGeom>
+          <a:ln>
+            <a:solidFill>
+              <a:schemeClr val="tx1"/>
+            </a:solidFill>
+            <a:tailEnd type="triangle"/>
+          </a:ln>
+        </p:spPr>
+        <p:style>
+          <a:lnRef idx="1">
+            <a:schemeClr val="accent1"/>
+          </a:lnRef>
+          <a:fillRef idx="0">
+            <a:schemeClr val="accent1"/>
+          </a:fillRef>
+          <a:effectRef idx="0">
+            <a:schemeClr val="accent1"/>
+          </a:effectRef>
+          <a:fontRef idx="minor">
+            <a:schemeClr val="tx1"/>
+          </a:fontRef>
+        </p:style>
+      </p:cxnSp>
+      <p:sp>
+        <p:nvSpPr>
+          <p:cNvPr id="63" name="Rectangle à coins arrondis 99">
+            <a:extLst>
+              <a:ext uri="{FF2B5EF4-FFF2-40B4-BE49-F238E27FC236}">
+                <a16:creationId xmlns:a16="http://schemas.microsoft.com/office/drawing/2014/main" id="{B01C5EF7-2E55-10AF-F661-F9BAADB0B2C1}"/>
+              </a:ext>
+            </a:extLst>
+          </p:cNvPr>
+          <p:cNvSpPr/>
+          <p:nvPr/>
+        </p:nvSpPr>
+        <p:spPr>
+          <a:xfrm>
+            <a:off x="6212103" y="4203613"/>
+            <a:ext cx="2689413" cy="280800"/>
+          </a:xfrm>
+          <a:prstGeom prst="roundRect">
+            <a:avLst/>
+          </a:prstGeom>
+          <a:ln/>
+        </p:spPr>
+        <p:style>
+          <a:lnRef idx="1">
+            <a:schemeClr val="accent6"/>
+          </a:lnRef>
+          <a:fillRef idx="2">
+            <a:schemeClr val="accent6"/>
+          </a:fillRef>
+          <a:effectRef idx="1">
+            <a:schemeClr val="accent6"/>
+          </a:effectRef>
+          <a:fontRef idx="minor">
+            <a:schemeClr val="dk1"/>
+          </a:fontRef>
+        </p:style>
+        <p:txBody>
+          <a:bodyPr rtlCol="0" anchor="ctr"/>
+          <a:lstStyle/>
+          <a:p>
+            <a:pPr algn="ctr"/>
+            <a:r>
+              <a:rPr lang="fr-FR" sz="1000" dirty="0"/>
+              <a:t>MesFrObservationOxygenSat</a:t>
+            </a:r>
+            <a:endParaRPr lang="fr-FR" sz="1000" dirty="0">
+              <a:solidFill>
+                <a:schemeClr val="tx1"/>
+              </a:solidFill>
+            </a:endParaRPr>
+          </a:p>
+        </p:txBody>
+      </p:sp>
+      <p:sp>
+        <p:nvSpPr>
+          <p:cNvPr id="85" name="Rectangle à coins arrondis 49">
+            <a:extLst>
+              <a:ext uri="{FF2B5EF4-FFF2-40B4-BE49-F238E27FC236}">
+                <a16:creationId xmlns:a16="http://schemas.microsoft.com/office/drawing/2014/main" id="{000D9D0A-8EBD-21B7-1801-B0C360DD41F7}"/>
+              </a:ext>
+            </a:extLst>
+          </p:cNvPr>
+          <p:cNvSpPr/>
+          <p:nvPr/>
+        </p:nvSpPr>
+        <p:spPr>
+          <a:xfrm>
+            <a:off x="1319552" y="4554919"/>
+            <a:ext cx="1653052" cy="308384"/>
+          </a:xfrm>
+          <a:prstGeom prst="roundRect">
+            <a:avLst/>
+          </a:prstGeom>
+          <a:ln/>
+        </p:spPr>
+        <p:style>
+          <a:lnRef idx="1">
+            <a:schemeClr val="accent1"/>
+          </a:lnRef>
+          <a:fillRef idx="2">
+            <a:schemeClr val="accent1"/>
+          </a:fillRef>
+          <a:effectRef idx="1">
+            <a:schemeClr val="accent1"/>
+          </a:effectRef>
+          <a:fontRef idx="minor">
+            <a:schemeClr val="dk1"/>
+          </a:fontRef>
+        </p:style>
+        <p:txBody>
+          <a:bodyPr rtlCol="0" anchor="ctr"/>
+          <a:lstStyle/>
+          <a:p>
+            <a:pPr algn="ctr"/>
+            <a:r>
+              <a:rPr lang="fr-FR" sz="1200" dirty="0">
+                <a:solidFill>
+                  <a:schemeClr val="tx1"/>
+                </a:solidFill>
+              </a:rPr>
+              <a:t>resprate</a:t>
+            </a:r>
+          </a:p>
+        </p:txBody>
+      </p:sp>
+      <p:sp>
+        <p:nvSpPr>
+          <p:cNvPr id="86" name="Rectangle à coins arrondis 97">
+            <a:extLst>
+              <a:ext uri="{FF2B5EF4-FFF2-40B4-BE49-F238E27FC236}">
+                <a16:creationId xmlns:a16="http://schemas.microsoft.com/office/drawing/2014/main" id="{8327BA80-1273-01B9-C923-93A0186F8DF9}"/>
+              </a:ext>
+            </a:extLst>
+          </p:cNvPr>
+          <p:cNvSpPr/>
+          <p:nvPr/>
+        </p:nvSpPr>
+        <p:spPr>
+          <a:xfrm>
+            <a:off x="3482113" y="4554052"/>
+            <a:ext cx="2225935" cy="315108"/>
+          </a:xfrm>
+          <a:prstGeom prst="roundRect">
+            <a:avLst/>
+          </a:prstGeom>
+          <a:ln/>
+        </p:spPr>
+        <p:style>
+          <a:lnRef idx="1">
+            <a:schemeClr val="accent4"/>
+          </a:lnRef>
+          <a:fillRef idx="2">
+            <a:schemeClr val="accent4"/>
+          </a:fillRef>
+          <a:effectRef idx="1">
+            <a:schemeClr val="accent4"/>
+          </a:effectRef>
+          <a:fontRef idx="minor">
+            <a:schemeClr val="dk1"/>
+          </a:fontRef>
+        </p:style>
+        <p:txBody>
+          <a:bodyPr rtlCol="0" anchor="ctr"/>
+          <a:lstStyle/>
+          <a:p>
+            <a:pPr algn="ctr"/>
+            <a:r>
+              <a:rPr lang="fr-FR" sz="1200" dirty="0">
+                <a:solidFill>
+                  <a:schemeClr val="tx1"/>
+                </a:solidFill>
+              </a:rPr>
+              <a:t>FrOservationRespRate</a:t>
+            </a:r>
+          </a:p>
+        </p:txBody>
+      </p:sp>
+      <p:sp>
+        <p:nvSpPr>
+          <p:cNvPr id="87" name="Rectangle à coins arrondis 99">
+            <a:extLst>
+              <a:ext uri="{FF2B5EF4-FFF2-40B4-BE49-F238E27FC236}">
+                <a16:creationId xmlns:a16="http://schemas.microsoft.com/office/drawing/2014/main" id="{A04F2B5D-30B0-0FDA-47BC-0E0838D69498}"/>
+              </a:ext>
+            </a:extLst>
+          </p:cNvPr>
+          <p:cNvSpPr/>
+          <p:nvPr/>
+        </p:nvSpPr>
+        <p:spPr>
+          <a:xfrm>
+            <a:off x="6212103" y="4568711"/>
+            <a:ext cx="2689413" cy="280800"/>
+          </a:xfrm>
+          <a:prstGeom prst="roundRect">
+            <a:avLst/>
+          </a:prstGeom>
+          <a:ln/>
+        </p:spPr>
+        <p:style>
+          <a:lnRef idx="1">
+            <a:schemeClr val="accent6"/>
+          </a:lnRef>
+          <a:fillRef idx="2">
+            <a:schemeClr val="accent6"/>
+          </a:fillRef>
+          <a:effectRef idx="1">
+            <a:schemeClr val="accent6"/>
+          </a:effectRef>
+          <a:fontRef idx="minor">
+            <a:schemeClr val="dk1"/>
+          </a:fontRef>
+        </p:style>
+        <p:txBody>
+          <a:bodyPr rtlCol="0" anchor="ctr"/>
+          <a:lstStyle/>
+          <a:p>
+            <a:pPr algn="ctr"/>
+            <a:r>
+              <a:rPr lang="fr-FR" sz="1000" dirty="0"/>
+              <a:t>MesFrObservationRespiratoryRate</a:t>
+            </a:r>
+            <a:endParaRPr lang="fr-FR" sz="1000" dirty="0">
+              <a:solidFill>
+                <a:schemeClr val="tx1"/>
+              </a:solidFill>
+            </a:endParaRPr>
+          </a:p>
+        </p:txBody>
+      </p:sp>
+      <p:cxnSp>
+        <p:nvCxnSpPr>
+          <p:cNvPr id="88" name="Connecteur droit avec flèche 50">
+            <a:extLst>
+              <a:ext uri="{FF2B5EF4-FFF2-40B4-BE49-F238E27FC236}">
+                <a16:creationId xmlns:a16="http://schemas.microsoft.com/office/drawing/2014/main" id="{72CD9368-A409-E713-5994-F84C64937970}"/>
+              </a:ext>
+            </a:extLst>
+          </p:cNvPr>
+          <p:cNvCxnSpPr>
+            <a:cxnSpLocks/>
+            <a:stCxn id="8" idx="2"/>
+            <a:endCxn id="85" idx="1"/>
+          </p:cNvCxnSpPr>
+          <p:nvPr/>
+        </p:nvCxnSpPr>
+        <p:spPr>
+          <a:xfrm rot="16200000" flipH="1">
+            <a:off x="-437351" y="2952208"/>
+            <a:ext cx="3083374" cy="430431"/>
+          </a:xfrm>
+          <a:prstGeom prst="bentConnector2">
+            <a:avLst/>
+          </a:prstGeom>
+          <a:ln>
+            <a:solidFill>
+              <a:schemeClr val="tx1"/>
+            </a:solidFill>
+            <a:tailEnd type="triangle"/>
+          </a:ln>
+        </p:spPr>
+        <p:style>
+          <a:lnRef idx="1">
+            <a:schemeClr val="accent1"/>
+          </a:lnRef>
+          <a:fillRef idx="0">
+            <a:schemeClr val="accent1"/>
+          </a:fillRef>
+          <a:effectRef idx="0">
+            <a:schemeClr val="accent1"/>
+          </a:effectRef>
+          <a:fontRef idx="minor">
+            <a:schemeClr val="tx1"/>
+          </a:fontRef>
+        </p:style>
+      </p:cxnSp>
+      <p:cxnSp>
+        <p:nvCxnSpPr>
+          <p:cNvPr id="103" name="Connecteur droit avec flèche 102">
+            <a:extLst>
+              <a:ext uri="{FF2B5EF4-FFF2-40B4-BE49-F238E27FC236}">
+                <a16:creationId xmlns:a16="http://schemas.microsoft.com/office/drawing/2014/main" id="{1251EF8D-B8DC-26AE-E7AE-BFB6DA1DE8AD}"/>
+              </a:ext>
+            </a:extLst>
+          </p:cNvPr>
+          <p:cNvCxnSpPr>
+            <a:cxnSpLocks/>
+            <a:stCxn id="86" idx="3"/>
+            <a:endCxn id="87" idx="1"/>
+          </p:cNvCxnSpPr>
+          <p:nvPr/>
+        </p:nvCxnSpPr>
+        <p:spPr>
+          <a:xfrm flipV="1">
+            <a:off x="5708048" y="4709111"/>
+            <a:ext cx="504055" cy="2495"/>
+          </a:xfrm>
+          <a:prstGeom prst="straightConnector1">
+            <a:avLst/>
+          </a:prstGeom>
+          <a:ln>
+            <a:solidFill>
+              <a:schemeClr val="tx1"/>
+            </a:solidFill>
+            <a:tailEnd type="triangle"/>
+          </a:ln>
+        </p:spPr>
+        <p:style>
+          <a:lnRef idx="1">
+            <a:schemeClr val="accent1"/>
+          </a:lnRef>
+          <a:fillRef idx="0">
+            <a:schemeClr val="accent1"/>
+          </a:fillRef>
+          <a:effectRef idx="0">
+            <a:schemeClr val="accent1"/>
+          </a:effectRef>
+          <a:fontRef idx="minor">
+            <a:schemeClr val="tx1"/>
+          </a:fontRef>
+        </p:style>
+      </p:cxnSp>
+      <p:cxnSp>
+        <p:nvCxnSpPr>
+          <p:cNvPr id="106" name="Connecteur droit avec flèche 105">
+            <a:extLst>
+              <a:ext uri="{FF2B5EF4-FFF2-40B4-BE49-F238E27FC236}">
+                <a16:creationId xmlns:a16="http://schemas.microsoft.com/office/drawing/2014/main" id="{30B19DC0-3614-A4CA-FF3D-C13473F8FF4A}"/>
+              </a:ext>
+            </a:extLst>
+          </p:cNvPr>
+          <p:cNvCxnSpPr>
+            <a:cxnSpLocks/>
+            <a:stCxn id="85" idx="3"/>
+            <a:endCxn id="86" idx="1"/>
+          </p:cNvCxnSpPr>
+          <p:nvPr/>
+        </p:nvCxnSpPr>
+        <p:spPr>
+          <a:xfrm>
+            <a:off x="2972604" y="4709111"/>
+            <a:ext cx="509509" cy="2495"/>
+          </a:xfrm>
+          <a:prstGeom prst="straightConnector1">
+            <a:avLst/>
+          </a:prstGeom>
+          <a:ln>
+            <a:solidFill>
+              <a:schemeClr val="tx1"/>
+            </a:solidFill>
+            <a:tailEnd type="triangle"/>
+          </a:ln>
+        </p:spPr>
+        <p:style>
+          <a:lnRef idx="1">
+            <a:schemeClr val="accent1"/>
+          </a:lnRef>
+          <a:fillRef idx="0">
+            <a:schemeClr val="accent1"/>
+          </a:fillRef>
+          <a:effectRef idx="0">
+            <a:schemeClr val="accent1"/>
+          </a:effectRef>
+          <a:fontRef idx="minor">
+            <a:schemeClr val="tx1"/>
+          </a:fontRef>
+        </p:style>
+      </p:cxnSp>
+    </p:spTree>
+    <p:extLst>
+      <p:ext uri="{BB962C8B-B14F-4D97-AF65-F5344CB8AC3E}">
+        <p14:creationId xmlns:p14="http://schemas.microsoft.com/office/powerpoint/2010/main" val="719129224"/>
+      </p:ext>
+    </p:extLst>
+  </p:cSld>
+  <p:clrMapOvr>
+    <a:masterClrMapping/>
+  </p:clrMapOvr>
+</p:sld>
+</file>
+
+<file path=ppt/slides/slide3.xml><?xml version="1.0" encoding="utf-8"?>
+<p:sld xmlns:a="http://schemas.openxmlformats.org/drawingml/2006/main" xmlns:r="http://schemas.openxmlformats.org/officeDocument/2006/relationships" xmlns:p="http://schemas.openxmlformats.org/presentationml/2006/main">
+  <p:cSld>
+    <p:spTree>
+      <p:nvGrpSpPr>
+        <p:cNvPr id="1" name="">
+          <a:extLst>
+            <a:ext uri="{FF2B5EF4-FFF2-40B4-BE49-F238E27FC236}">
+              <a16:creationId xmlns:a16="http://schemas.microsoft.com/office/drawing/2014/main" id="{684F02C2-B2C0-29C3-7961-A1D329FD8B0A}"/>
+            </a:ext>
+          </a:extLst>
+        </p:cNvPr>
         <p:cNvGrpSpPr/>
         <p:nvPr/>
       </p:nvGrpSpPr>
@@ -5602,7 +8864,7 @@
           <p:cNvPr id="7" name="Image 6">
             <a:extLst>
               <a:ext uri="{FF2B5EF4-FFF2-40B4-BE49-F238E27FC236}">
-                <a16:creationId xmlns:a16="http://schemas.microsoft.com/office/drawing/2014/main" id="{B6C62B71-D642-43EC-B8BB-EBD81B517C27}"/>
+                <a16:creationId xmlns:a16="http://schemas.microsoft.com/office/drawing/2014/main" id="{9D2FC33C-DEE1-C07F-52AD-B817EEBF72C4}"/>
               </a:ext>
             </a:extLst>
           </p:cNvPr>
@@ -5630,7 +8892,7 @@
     </p:spTree>
     <p:extLst>
       <p:ext uri="{BB962C8B-B14F-4D97-AF65-F5344CB8AC3E}">
-        <p14:creationId xmlns:p14="http://schemas.microsoft.com/office/powerpoint/2010/main" val="379876073"/>
+        <p14:creationId xmlns:p14="http://schemas.microsoft.com/office/powerpoint/2010/main" val="2611811458"/>
       </p:ext>
     </p:extLst>
   </p:cSld>
@@ -5640,7 +8902,7 @@
 </p:sld>
 </file>
 
-<file path=ppt/slides/slide3.xml><?xml version="1.0" encoding="utf-8"?>
+<file path=ppt/slides/slide4.xml><?xml version="1.0" encoding="utf-8"?>
 <p:sld xmlns:a="http://schemas.openxmlformats.org/drawingml/2006/main" xmlns:r="http://schemas.openxmlformats.org/officeDocument/2006/relationships" xmlns:p="http://schemas.openxmlformats.org/presentationml/2006/main">
   <p:cSld>
     <p:spTree>

</xml_diff>